<commit_message>
edit readme and update slides
</commit_message>
<xml_diff>
--- a/Class-02-OILab-Tour/OCN479_Lecture02_OILabTour.pptx
+++ b/Class-02-OILab-Tour/OCN479_Lecture02_OILabTour.pptx
@@ -5,13 +5,15 @@
     <p:sldMasterId id="2147483660" r:id="rId1"/>
   </p:sldMasterIdLst>
   <p:notesMasterIdLst>
-    <p:notesMasterId r:id="rId6"/>
+    <p:notesMasterId r:id="rId8"/>
   </p:notesMasterIdLst>
   <p:sldIdLst>
     <p:sldId id="256" r:id="rId2"/>
     <p:sldId id="257" r:id="rId3"/>
     <p:sldId id="258" r:id="rId4"/>
     <p:sldId id="259" r:id="rId5"/>
+    <p:sldId id="260" r:id="rId6"/>
+    <p:sldId id="261" r:id="rId7"/>
   </p:sldIdLst>
   <p:sldSz cx="12192000" cy="6858000"/>
   <p:notesSz cx="6858000" cy="9144000"/>
@@ -118,6 +120,3255 @@
 </p:presentation>
 </file>
 
+<file path=ppt/diagrams/colors1.xml><?xml version="1.0" encoding="utf-8"?>
+<dgm:colorsDef xmlns:dgm="http://schemas.openxmlformats.org/drawingml/2006/diagram" xmlns:a="http://schemas.openxmlformats.org/drawingml/2006/main" uniqueId="urn:microsoft.com/office/officeart/2005/8/colors/colorful2">
+  <dgm:title val=""/>
+  <dgm:desc val=""/>
+  <dgm:catLst>
+    <dgm:cat type="colorful" pri="10200"/>
+  </dgm:catLst>
+  <dgm:styleLbl name="node0">
+    <dgm:fillClrLst meth="repeat">
+      <a:schemeClr val="accent1"/>
+    </dgm:fillClrLst>
+    <dgm:linClrLst meth="repeat">
+      <a:schemeClr val="lt1"/>
+    </dgm:linClrLst>
+    <dgm:effectClrLst/>
+    <dgm:txLinClrLst/>
+    <dgm:txFillClrLst/>
+    <dgm:txEffectClrLst/>
+  </dgm:styleLbl>
+  <dgm:styleLbl name="node1">
+    <dgm:fillClrLst>
+      <a:schemeClr val="accent2"/>
+      <a:schemeClr val="accent3"/>
+    </dgm:fillClrLst>
+    <dgm:linClrLst meth="repeat">
+      <a:schemeClr val="lt1"/>
+    </dgm:linClrLst>
+    <dgm:effectClrLst/>
+    <dgm:txLinClrLst/>
+    <dgm:txFillClrLst/>
+    <dgm:txEffectClrLst/>
+  </dgm:styleLbl>
+  <dgm:styleLbl name="alignNode1">
+    <dgm:fillClrLst>
+      <a:schemeClr val="accent2"/>
+      <a:schemeClr val="accent3"/>
+    </dgm:fillClrLst>
+    <dgm:linClrLst>
+      <a:schemeClr val="accent2"/>
+      <a:schemeClr val="accent3"/>
+    </dgm:linClrLst>
+    <dgm:effectClrLst/>
+    <dgm:txLinClrLst/>
+    <dgm:txFillClrLst/>
+    <dgm:txEffectClrLst/>
+  </dgm:styleLbl>
+  <dgm:styleLbl name="lnNode1">
+    <dgm:fillClrLst>
+      <a:schemeClr val="accent2"/>
+      <a:schemeClr val="accent3"/>
+    </dgm:fillClrLst>
+    <dgm:linClrLst meth="repeat">
+      <a:schemeClr val="lt1"/>
+    </dgm:linClrLst>
+    <dgm:effectClrLst/>
+    <dgm:txLinClrLst/>
+    <dgm:txFillClrLst/>
+    <dgm:txEffectClrLst/>
+  </dgm:styleLbl>
+  <dgm:styleLbl name="vennNode1">
+    <dgm:fillClrLst>
+      <a:schemeClr val="accent2">
+        <a:alpha val="50000"/>
+      </a:schemeClr>
+      <a:schemeClr val="accent3">
+        <a:alpha val="50000"/>
+      </a:schemeClr>
+    </dgm:fillClrLst>
+    <dgm:linClrLst meth="repeat">
+      <a:schemeClr val="lt1"/>
+    </dgm:linClrLst>
+    <dgm:effectClrLst/>
+    <dgm:txLinClrLst/>
+    <dgm:txFillClrLst/>
+    <dgm:txEffectClrLst/>
+  </dgm:styleLbl>
+  <dgm:styleLbl name="node2">
+    <dgm:fillClrLst>
+      <a:schemeClr val="accent3"/>
+    </dgm:fillClrLst>
+    <dgm:linClrLst meth="repeat">
+      <a:schemeClr val="lt1"/>
+    </dgm:linClrLst>
+    <dgm:effectClrLst/>
+    <dgm:txLinClrLst/>
+    <dgm:txFillClrLst/>
+    <dgm:txEffectClrLst/>
+  </dgm:styleLbl>
+  <dgm:styleLbl name="node3">
+    <dgm:fillClrLst>
+      <a:schemeClr val="accent4"/>
+    </dgm:fillClrLst>
+    <dgm:linClrLst meth="repeat">
+      <a:schemeClr val="lt1"/>
+    </dgm:linClrLst>
+    <dgm:effectClrLst/>
+    <dgm:txLinClrLst/>
+    <dgm:txFillClrLst/>
+    <dgm:txEffectClrLst/>
+  </dgm:styleLbl>
+  <dgm:styleLbl name="node4">
+    <dgm:fillClrLst>
+      <a:schemeClr val="accent5"/>
+    </dgm:fillClrLst>
+    <dgm:linClrLst meth="repeat">
+      <a:schemeClr val="lt1"/>
+    </dgm:linClrLst>
+    <dgm:effectClrLst/>
+    <dgm:txLinClrLst/>
+    <dgm:txFillClrLst/>
+    <dgm:txEffectClrLst/>
+  </dgm:styleLbl>
+  <dgm:styleLbl name="fgImgPlace1">
+    <dgm:fillClrLst>
+      <a:schemeClr val="accent2">
+        <a:tint val="50000"/>
+      </a:schemeClr>
+      <a:schemeClr val="accent3">
+        <a:tint val="50000"/>
+      </a:schemeClr>
+    </dgm:fillClrLst>
+    <dgm:linClrLst meth="repeat">
+      <a:schemeClr val="lt1"/>
+    </dgm:linClrLst>
+    <dgm:effectClrLst/>
+    <dgm:txLinClrLst/>
+    <dgm:txFillClrLst meth="repeat">
+      <a:schemeClr val="lt1"/>
+    </dgm:txFillClrLst>
+    <dgm:txEffectClrLst/>
+  </dgm:styleLbl>
+  <dgm:styleLbl name="alignImgPlace1">
+    <dgm:fillClrLst>
+      <a:schemeClr val="accent2">
+        <a:tint val="50000"/>
+      </a:schemeClr>
+      <a:schemeClr val="accent3">
+        <a:tint val="20000"/>
+      </a:schemeClr>
+    </dgm:fillClrLst>
+    <dgm:linClrLst meth="repeat">
+      <a:schemeClr val="lt1"/>
+    </dgm:linClrLst>
+    <dgm:effectClrLst/>
+    <dgm:txLinClrLst/>
+    <dgm:txFillClrLst meth="repeat">
+      <a:schemeClr val="lt1"/>
+    </dgm:txFillClrLst>
+    <dgm:txEffectClrLst/>
+  </dgm:styleLbl>
+  <dgm:styleLbl name="bgImgPlace1">
+    <dgm:fillClrLst>
+      <a:schemeClr val="accent2">
+        <a:tint val="50000"/>
+      </a:schemeClr>
+      <a:schemeClr val="accent3">
+        <a:tint val="20000"/>
+      </a:schemeClr>
+    </dgm:fillClrLst>
+    <dgm:linClrLst meth="repeat">
+      <a:schemeClr val="lt1"/>
+    </dgm:linClrLst>
+    <dgm:effectClrLst/>
+    <dgm:txLinClrLst/>
+    <dgm:txFillClrLst meth="repeat">
+      <a:schemeClr val="lt1"/>
+    </dgm:txFillClrLst>
+    <dgm:txEffectClrLst/>
+  </dgm:styleLbl>
+  <dgm:styleLbl name="sibTrans2D1">
+    <dgm:fillClrLst>
+      <a:schemeClr val="accent2"/>
+      <a:schemeClr val="accent3"/>
+    </dgm:fillClrLst>
+    <dgm:linClrLst meth="repeat">
+      <a:schemeClr val="lt1"/>
+    </dgm:linClrLst>
+    <dgm:effectClrLst/>
+    <dgm:txLinClrLst/>
+    <dgm:txFillClrLst/>
+    <dgm:txEffectClrLst/>
+  </dgm:styleLbl>
+  <dgm:styleLbl name="fgSibTrans2D1">
+    <dgm:fillClrLst>
+      <a:schemeClr val="accent2"/>
+      <a:schemeClr val="accent3"/>
+    </dgm:fillClrLst>
+    <dgm:linClrLst meth="repeat">
+      <a:schemeClr val="lt1"/>
+    </dgm:linClrLst>
+    <dgm:effectClrLst/>
+    <dgm:txLinClrLst/>
+    <dgm:txFillClrLst meth="repeat">
+      <a:schemeClr val="lt1"/>
+    </dgm:txFillClrLst>
+    <dgm:txEffectClrLst/>
+  </dgm:styleLbl>
+  <dgm:styleLbl name="bgSibTrans2D1">
+    <dgm:fillClrLst>
+      <a:schemeClr val="accent2"/>
+      <a:schemeClr val="accent3"/>
+    </dgm:fillClrLst>
+    <dgm:linClrLst meth="repeat">
+      <a:schemeClr val="lt1"/>
+    </dgm:linClrLst>
+    <dgm:effectClrLst/>
+    <dgm:txLinClrLst/>
+    <dgm:txFillClrLst meth="repeat">
+      <a:schemeClr val="lt1"/>
+    </dgm:txFillClrLst>
+    <dgm:txEffectClrLst/>
+  </dgm:styleLbl>
+  <dgm:styleLbl name="sibTrans1D1">
+    <dgm:fillClrLst/>
+    <dgm:linClrLst>
+      <a:schemeClr val="accent2"/>
+      <a:schemeClr val="accent3"/>
+    </dgm:linClrLst>
+    <dgm:effectClrLst/>
+    <dgm:txLinClrLst/>
+    <dgm:txFillClrLst meth="repeat">
+      <a:schemeClr val="tx1"/>
+    </dgm:txFillClrLst>
+    <dgm:txEffectClrLst/>
+  </dgm:styleLbl>
+  <dgm:styleLbl name="callout">
+    <dgm:fillClrLst meth="repeat">
+      <a:schemeClr val="accent2"/>
+    </dgm:fillClrLst>
+    <dgm:linClrLst meth="repeat">
+      <a:schemeClr val="accent2">
+        <a:tint val="50000"/>
+      </a:schemeClr>
+    </dgm:linClrLst>
+    <dgm:effectClrLst/>
+    <dgm:txLinClrLst/>
+    <dgm:txFillClrLst meth="repeat">
+      <a:schemeClr val="tx1"/>
+    </dgm:txFillClrLst>
+    <dgm:txEffectClrLst/>
+  </dgm:styleLbl>
+  <dgm:styleLbl name="asst0">
+    <dgm:fillClrLst meth="repeat">
+      <a:schemeClr val="accent2"/>
+    </dgm:fillClrLst>
+    <dgm:linClrLst meth="repeat">
+      <a:schemeClr val="lt1">
+        <a:shade val="80000"/>
+      </a:schemeClr>
+    </dgm:linClrLst>
+    <dgm:effectClrLst/>
+    <dgm:txLinClrLst/>
+    <dgm:txFillClrLst/>
+    <dgm:txEffectClrLst/>
+  </dgm:styleLbl>
+  <dgm:styleLbl name="asst1">
+    <dgm:fillClrLst meth="repeat">
+      <a:schemeClr val="accent3"/>
+    </dgm:fillClrLst>
+    <dgm:linClrLst meth="repeat">
+      <a:schemeClr val="lt1">
+        <a:shade val="80000"/>
+      </a:schemeClr>
+    </dgm:linClrLst>
+    <dgm:effectClrLst/>
+    <dgm:txLinClrLst/>
+    <dgm:txFillClrLst/>
+    <dgm:txEffectClrLst/>
+  </dgm:styleLbl>
+  <dgm:styleLbl name="asst2">
+    <dgm:fillClrLst>
+      <a:schemeClr val="accent4"/>
+    </dgm:fillClrLst>
+    <dgm:linClrLst meth="repeat">
+      <a:schemeClr val="lt1"/>
+    </dgm:linClrLst>
+    <dgm:effectClrLst/>
+    <dgm:txLinClrLst/>
+    <dgm:txFillClrLst/>
+    <dgm:txEffectClrLst/>
+  </dgm:styleLbl>
+  <dgm:styleLbl name="asst3">
+    <dgm:fillClrLst>
+      <a:schemeClr val="accent5"/>
+    </dgm:fillClrLst>
+    <dgm:linClrLst meth="repeat">
+      <a:schemeClr val="lt1"/>
+    </dgm:linClrLst>
+    <dgm:effectClrLst/>
+    <dgm:txLinClrLst/>
+    <dgm:txFillClrLst/>
+    <dgm:txEffectClrLst/>
+  </dgm:styleLbl>
+  <dgm:styleLbl name="asst4">
+    <dgm:fillClrLst>
+      <a:schemeClr val="accent6"/>
+    </dgm:fillClrLst>
+    <dgm:linClrLst meth="repeat">
+      <a:schemeClr val="lt1"/>
+    </dgm:linClrLst>
+    <dgm:effectClrLst/>
+    <dgm:txLinClrLst/>
+    <dgm:txFillClrLst/>
+    <dgm:txEffectClrLst/>
+  </dgm:styleLbl>
+  <dgm:styleLbl name="parChTrans2D1">
+    <dgm:fillClrLst meth="repeat">
+      <a:schemeClr val="accent2"/>
+    </dgm:fillClrLst>
+    <dgm:linClrLst meth="repeat">
+      <a:schemeClr val="lt1"/>
+    </dgm:linClrLst>
+    <dgm:effectClrLst/>
+    <dgm:txLinClrLst/>
+    <dgm:txFillClrLst meth="repeat">
+      <a:schemeClr val="lt1"/>
+    </dgm:txFillClrLst>
+    <dgm:txEffectClrLst/>
+  </dgm:styleLbl>
+  <dgm:styleLbl name="parChTrans2D2">
+    <dgm:fillClrLst meth="repeat">
+      <a:schemeClr val="accent3"/>
+    </dgm:fillClrLst>
+    <dgm:linClrLst meth="repeat">
+      <a:schemeClr val="lt1"/>
+    </dgm:linClrLst>
+    <dgm:effectClrLst/>
+    <dgm:txLinClrLst/>
+    <dgm:txFillClrLst/>
+    <dgm:txEffectClrLst/>
+  </dgm:styleLbl>
+  <dgm:styleLbl name="parChTrans2D3">
+    <dgm:fillClrLst meth="repeat">
+      <a:schemeClr val="accent4"/>
+    </dgm:fillClrLst>
+    <dgm:linClrLst meth="repeat">
+      <a:schemeClr val="lt1"/>
+    </dgm:linClrLst>
+    <dgm:effectClrLst/>
+    <dgm:txLinClrLst/>
+    <dgm:txFillClrLst/>
+    <dgm:txEffectClrLst/>
+  </dgm:styleLbl>
+  <dgm:styleLbl name="parChTrans2D4">
+    <dgm:fillClrLst meth="repeat">
+      <a:schemeClr val="accent5"/>
+    </dgm:fillClrLst>
+    <dgm:linClrLst meth="repeat">
+      <a:schemeClr val="lt1"/>
+    </dgm:linClrLst>
+    <dgm:effectClrLst/>
+    <dgm:txLinClrLst/>
+    <dgm:txFillClrLst meth="repeat">
+      <a:schemeClr val="lt1"/>
+    </dgm:txFillClrLst>
+    <dgm:txEffectClrLst/>
+  </dgm:styleLbl>
+  <dgm:styleLbl name="parChTrans1D1">
+    <dgm:fillClrLst meth="repeat">
+      <a:schemeClr val="accent2"/>
+    </dgm:fillClrLst>
+    <dgm:linClrLst meth="repeat">
+      <a:schemeClr val="accent2"/>
+    </dgm:linClrLst>
+    <dgm:effectClrLst/>
+    <dgm:txLinClrLst/>
+    <dgm:txFillClrLst meth="repeat">
+      <a:schemeClr val="tx1"/>
+    </dgm:txFillClrLst>
+    <dgm:txEffectClrLst/>
+  </dgm:styleLbl>
+  <dgm:styleLbl name="parChTrans1D2">
+    <dgm:fillClrLst meth="repeat">
+      <a:schemeClr val="accent2">
+        <a:tint val="90000"/>
+      </a:schemeClr>
+    </dgm:fillClrLst>
+    <dgm:linClrLst meth="repeat">
+      <a:schemeClr val="accent3"/>
+    </dgm:linClrLst>
+    <dgm:effectClrLst/>
+    <dgm:txLinClrLst/>
+    <dgm:txFillClrLst meth="repeat">
+      <a:schemeClr val="tx1"/>
+    </dgm:txFillClrLst>
+    <dgm:txEffectClrLst/>
+  </dgm:styleLbl>
+  <dgm:styleLbl name="parChTrans1D3">
+    <dgm:fillClrLst meth="repeat">
+      <a:schemeClr val="accent2">
+        <a:tint val="70000"/>
+      </a:schemeClr>
+    </dgm:fillClrLst>
+    <dgm:linClrLst meth="repeat">
+      <a:schemeClr val="accent4"/>
+    </dgm:linClrLst>
+    <dgm:effectClrLst/>
+    <dgm:txLinClrLst/>
+    <dgm:txFillClrLst meth="repeat">
+      <a:schemeClr val="tx1"/>
+    </dgm:txFillClrLst>
+    <dgm:txEffectClrLst/>
+  </dgm:styleLbl>
+  <dgm:styleLbl name="parChTrans1D4">
+    <dgm:fillClrLst meth="repeat">
+      <a:schemeClr val="accent2">
+        <a:tint val="50000"/>
+      </a:schemeClr>
+    </dgm:fillClrLst>
+    <dgm:linClrLst meth="repeat">
+      <a:schemeClr val="accent5"/>
+    </dgm:linClrLst>
+    <dgm:effectClrLst/>
+    <dgm:txLinClrLst/>
+    <dgm:txFillClrLst meth="repeat">
+      <a:schemeClr val="tx1"/>
+    </dgm:txFillClrLst>
+    <dgm:txEffectClrLst/>
+  </dgm:styleLbl>
+  <dgm:styleLbl name="fgAcc1">
+    <dgm:fillClrLst meth="repeat">
+      <a:schemeClr val="lt1">
+        <a:alpha val="90000"/>
+      </a:schemeClr>
+    </dgm:fillClrLst>
+    <dgm:linClrLst>
+      <a:schemeClr val="accent2"/>
+      <a:schemeClr val="accent3"/>
+    </dgm:linClrLst>
+    <dgm:effectClrLst/>
+    <dgm:txLinClrLst/>
+    <dgm:txFillClrLst meth="repeat">
+      <a:schemeClr val="dk1"/>
+    </dgm:txFillClrLst>
+    <dgm:txEffectClrLst/>
+  </dgm:styleLbl>
+  <dgm:styleLbl name="conFgAcc1">
+    <dgm:fillClrLst meth="repeat">
+      <a:schemeClr val="lt1">
+        <a:alpha val="90000"/>
+      </a:schemeClr>
+    </dgm:fillClrLst>
+    <dgm:linClrLst>
+      <a:schemeClr val="accent2"/>
+      <a:schemeClr val="accent3"/>
+    </dgm:linClrLst>
+    <dgm:effectClrLst/>
+    <dgm:txLinClrLst/>
+    <dgm:txFillClrLst meth="repeat">
+      <a:schemeClr val="dk1"/>
+    </dgm:txFillClrLst>
+    <dgm:txEffectClrLst/>
+  </dgm:styleLbl>
+  <dgm:styleLbl name="alignAcc1">
+    <dgm:fillClrLst meth="repeat">
+      <a:schemeClr val="lt1">
+        <a:alpha val="90000"/>
+      </a:schemeClr>
+    </dgm:fillClrLst>
+    <dgm:linClrLst>
+      <a:schemeClr val="accent2"/>
+      <a:schemeClr val="accent3"/>
+    </dgm:linClrLst>
+    <dgm:effectClrLst/>
+    <dgm:txLinClrLst/>
+    <dgm:txFillClrLst meth="repeat">
+      <a:schemeClr val="dk1"/>
+    </dgm:txFillClrLst>
+    <dgm:txEffectClrLst/>
+  </dgm:styleLbl>
+  <dgm:styleLbl name="trAlignAcc1">
+    <dgm:fillClrLst meth="repeat">
+      <a:schemeClr val="lt1">
+        <a:alpha val="40000"/>
+      </a:schemeClr>
+    </dgm:fillClrLst>
+    <dgm:linClrLst meth="repeat">
+      <a:schemeClr val="accent2"/>
+    </dgm:linClrLst>
+    <dgm:effectClrLst/>
+    <dgm:txLinClrLst/>
+    <dgm:txFillClrLst meth="repeat">
+      <a:schemeClr val="dk1"/>
+    </dgm:txFillClrLst>
+    <dgm:txEffectClrLst/>
+  </dgm:styleLbl>
+  <dgm:styleLbl name="bgAcc1">
+    <dgm:fillClrLst meth="repeat">
+      <a:schemeClr val="lt1">
+        <a:alpha val="90000"/>
+      </a:schemeClr>
+    </dgm:fillClrLst>
+    <dgm:linClrLst>
+      <a:schemeClr val="accent2"/>
+      <a:schemeClr val="accent3"/>
+    </dgm:linClrLst>
+    <dgm:effectClrLst/>
+    <dgm:txLinClrLst/>
+    <dgm:txFillClrLst meth="repeat">
+      <a:schemeClr val="dk1"/>
+    </dgm:txFillClrLst>
+    <dgm:txEffectClrLst/>
+  </dgm:styleLbl>
+  <dgm:styleLbl name="solidFgAcc1">
+    <dgm:fillClrLst meth="repeat">
+      <a:schemeClr val="lt1"/>
+    </dgm:fillClrLst>
+    <dgm:linClrLst>
+      <a:schemeClr val="accent2"/>
+      <a:schemeClr val="accent3"/>
+    </dgm:linClrLst>
+    <dgm:effectClrLst/>
+    <dgm:txLinClrLst/>
+    <dgm:txFillClrLst meth="repeat">
+      <a:schemeClr val="dk1"/>
+    </dgm:txFillClrLst>
+    <dgm:txEffectClrLst/>
+  </dgm:styleLbl>
+  <dgm:styleLbl name="solidAlignAcc1">
+    <dgm:fillClrLst meth="repeat">
+      <a:schemeClr val="lt1"/>
+    </dgm:fillClrLst>
+    <dgm:linClrLst>
+      <a:schemeClr val="accent2"/>
+      <a:schemeClr val="accent3"/>
+    </dgm:linClrLst>
+    <dgm:effectClrLst/>
+    <dgm:txLinClrLst/>
+    <dgm:txFillClrLst meth="repeat">
+      <a:schemeClr val="dk1"/>
+    </dgm:txFillClrLst>
+    <dgm:txEffectClrLst/>
+  </dgm:styleLbl>
+  <dgm:styleLbl name="solidBgAcc1">
+    <dgm:fillClrLst meth="repeat">
+      <a:schemeClr val="lt1"/>
+    </dgm:fillClrLst>
+    <dgm:linClrLst>
+      <a:schemeClr val="accent2"/>
+      <a:schemeClr val="accent3"/>
+    </dgm:linClrLst>
+    <dgm:effectClrLst/>
+    <dgm:txLinClrLst/>
+    <dgm:txFillClrLst meth="repeat">
+      <a:schemeClr val="dk1"/>
+    </dgm:txFillClrLst>
+    <dgm:txEffectClrLst/>
+  </dgm:styleLbl>
+  <dgm:styleLbl name="fgAccFollowNode1">
+    <dgm:fillClrLst>
+      <a:schemeClr val="accent2">
+        <a:tint val="40000"/>
+        <a:alpha val="90000"/>
+      </a:schemeClr>
+      <a:schemeClr val="accent3">
+        <a:tint val="40000"/>
+        <a:alpha val="90000"/>
+      </a:schemeClr>
+    </dgm:fillClrLst>
+    <dgm:linClrLst>
+      <a:schemeClr val="accent2">
+        <a:tint val="40000"/>
+        <a:alpha val="90000"/>
+      </a:schemeClr>
+      <a:schemeClr val="accent3">
+        <a:tint val="40000"/>
+        <a:alpha val="90000"/>
+      </a:schemeClr>
+    </dgm:linClrLst>
+    <dgm:effectClrLst/>
+    <dgm:txLinClrLst/>
+    <dgm:txFillClrLst meth="repeat">
+      <a:schemeClr val="dk1"/>
+    </dgm:txFillClrLst>
+    <dgm:txEffectClrLst/>
+  </dgm:styleLbl>
+  <dgm:styleLbl name="alignAccFollowNode1">
+    <dgm:fillClrLst>
+      <a:schemeClr val="accent2">
+        <a:tint val="40000"/>
+        <a:alpha val="90000"/>
+      </a:schemeClr>
+      <a:schemeClr val="accent3">
+        <a:tint val="40000"/>
+        <a:alpha val="90000"/>
+      </a:schemeClr>
+    </dgm:fillClrLst>
+    <dgm:linClrLst>
+      <a:schemeClr val="accent2">
+        <a:tint val="40000"/>
+        <a:alpha val="90000"/>
+      </a:schemeClr>
+      <a:schemeClr val="accent3">
+        <a:tint val="40000"/>
+        <a:alpha val="90000"/>
+      </a:schemeClr>
+    </dgm:linClrLst>
+    <dgm:effectClrLst/>
+    <dgm:txLinClrLst/>
+    <dgm:txFillClrLst meth="repeat">
+      <a:schemeClr val="dk1"/>
+    </dgm:txFillClrLst>
+    <dgm:txEffectClrLst/>
+  </dgm:styleLbl>
+  <dgm:styleLbl name="bgAccFollowNode1">
+    <dgm:fillClrLst>
+      <a:schemeClr val="accent2">
+        <a:tint val="40000"/>
+        <a:alpha val="90000"/>
+      </a:schemeClr>
+      <a:schemeClr val="accent3">
+        <a:tint val="40000"/>
+        <a:alpha val="90000"/>
+      </a:schemeClr>
+    </dgm:fillClrLst>
+    <dgm:linClrLst>
+      <a:schemeClr val="accent2">
+        <a:tint val="40000"/>
+        <a:alpha val="90000"/>
+      </a:schemeClr>
+      <a:schemeClr val="accent3">
+        <a:tint val="40000"/>
+        <a:alpha val="90000"/>
+      </a:schemeClr>
+    </dgm:linClrLst>
+    <dgm:effectClrLst/>
+    <dgm:txLinClrLst/>
+    <dgm:txFillClrLst meth="repeat">
+      <a:schemeClr val="dk1"/>
+    </dgm:txFillClrLst>
+    <dgm:txEffectClrLst/>
+  </dgm:styleLbl>
+  <dgm:styleLbl name="fgAcc0">
+    <dgm:fillClrLst meth="repeat">
+      <a:schemeClr val="lt1">
+        <a:alpha val="90000"/>
+      </a:schemeClr>
+    </dgm:fillClrLst>
+    <dgm:linClrLst>
+      <a:schemeClr val="accent1"/>
+    </dgm:linClrLst>
+    <dgm:effectClrLst/>
+    <dgm:txLinClrLst/>
+    <dgm:txFillClrLst meth="repeat">
+      <a:schemeClr val="dk1"/>
+    </dgm:txFillClrLst>
+    <dgm:txEffectClrLst/>
+  </dgm:styleLbl>
+  <dgm:styleLbl name="fgAcc2">
+    <dgm:fillClrLst meth="repeat">
+      <a:schemeClr val="lt1">
+        <a:alpha val="90000"/>
+      </a:schemeClr>
+    </dgm:fillClrLst>
+    <dgm:linClrLst>
+      <a:schemeClr val="accent3"/>
+    </dgm:linClrLst>
+    <dgm:effectClrLst/>
+    <dgm:txLinClrLst/>
+    <dgm:txFillClrLst meth="repeat">
+      <a:schemeClr val="dk1"/>
+    </dgm:txFillClrLst>
+    <dgm:txEffectClrLst/>
+  </dgm:styleLbl>
+  <dgm:styleLbl name="fgAcc3">
+    <dgm:fillClrLst meth="repeat">
+      <a:schemeClr val="lt1">
+        <a:alpha val="90000"/>
+      </a:schemeClr>
+    </dgm:fillClrLst>
+    <dgm:linClrLst>
+      <a:schemeClr val="accent4"/>
+    </dgm:linClrLst>
+    <dgm:effectClrLst/>
+    <dgm:txLinClrLst/>
+    <dgm:txFillClrLst meth="repeat">
+      <a:schemeClr val="dk1"/>
+    </dgm:txFillClrLst>
+    <dgm:txEffectClrLst/>
+  </dgm:styleLbl>
+  <dgm:styleLbl name="fgAcc4">
+    <dgm:fillClrLst meth="repeat">
+      <a:schemeClr val="lt1">
+        <a:alpha val="90000"/>
+      </a:schemeClr>
+    </dgm:fillClrLst>
+    <dgm:linClrLst>
+      <a:schemeClr val="accent5"/>
+    </dgm:linClrLst>
+    <dgm:effectClrLst/>
+    <dgm:txLinClrLst/>
+    <dgm:txFillClrLst meth="repeat">
+      <a:schemeClr val="dk1"/>
+    </dgm:txFillClrLst>
+    <dgm:txEffectClrLst/>
+  </dgm:styleLbl>
+  <dgm:styleLbl name="bgShp">
+    <dgm:fillClrLst meth="repeat">
+      <a:schemeClr val="accent2">
+        <a:tint val="40000"/>
+      </a:schemeClr>
+    </dgm:fillClrLst>
+    <dgm:linClrLst meth="repeat">
+      <a:schemeClr val="dk1"/>
+    </dgm:linClrLst>
+    <dgm:effectClrLst/>
+    <dgm:txLinClrLst/>
+    <dgm:txFillClrLst meth="repeat">
+      <a:schemeClr val="dk1"/>
+    </dgm:txFillClrLst>
+    <dgm:txEffectClrLst/>
+  </dgm:styleLbl>
+  <dgm:styleLbl name="dkBgShp">
+    <dgm:fillClrLst meth="repeat">
+      <a:schemeClr val="accent2">
+        <a:shade val="90000"/>
+      </a:schemeClr>
+    </dgm:fillClrLst>
+    <dgm:linClrLst meth="repeat">
+      <a:schemeClr val="dk1"/>
+    </dgm:linClrLst>
+    <dgm:effectClrLst/>
+    <dgm:txLinClrLst/>
+    <dgm:txFillClrLst meth="repeat">
+      <a:schemeClr val="lt1"/>
+    </dgm:txFillClrLst>
+    <dgm:txEffectClrLst/>
+  </dgm:styleLbl>
+  <dgm:styleLbl name="trBgShp">
+    <dgm:fillClrLst meth="repeat">
+      <a:schemeClr val="accent2">
+        <a:tint val="50000"/>
+        <a:alpha val="40000"/>
+      </a:schemeClr>
+    </dgm:fillClrLst>
+    <dgm:linClrLst meth="repeat">
+      <a:schemeClr val="accent2"/>
+    </dgm:linClrLst>
+    <dgm:effectClrLst/>
+    <dgm:txLinClrLst/>
+    <dgm:txFillClrLst meth="repeat">
+      <a:schemeClr val="lt1"/>
+    </dgm:txFillClrLst>
+    <dgm:txEffectClrLst/>
+  </dgm:styleLbl>
+  <dgm:styleLbl name="fgShp">
+    <dgm:fillClrLst meth="repeat">
+      <a:schemeClr val="accent2">
+        <a:tint val="40000"/>
+      </a:schemeClr>
+    </dgm:fillClrLst>
+    <dgm:linClrLst meth="repeat">
+      <a:schemeClr val="lt1"/>
+    </dgm:linClrLst>
+    <dgm:effectClrLst/>
+    <dgm:txLinClrLst/>
+    <dgm:txFillClrLst meth="repeat">
+      <a:schemeClr val="dk1"/>
+    </dgm:txFillClrLst>
+    <dgm:txEffectClrLst/>
+  </dgm:styleLbl>
+  <dgm:styleLbl name="revTx">
+    <dgm:fillClrLst meth="repeat">
+      <a:schemeClr val="lt1">
+        <a:alpha val="0"/>
+      </a:schemeClr>
+    </dgm:fillClrLst>
+    <dgm:linClrLst meth="repeat">
+      <a:schemeClr val="dk1">
+        <a:alpha val="0"/>
+      </a:schemeClr>
+    </dgm:linClrLst>
+    <dgm:effectClrLst/>
+    <dgm:txLinClrLst/>
+    <dgm:txFillClrLst meth="repeat">
+      <a:schemeClr val="tx1"/>
+    </dgm:txFillClrLst>
+    <dgm:txEffectClrLst/>
+  </dgm:styleLbl>
+</dgm:colorsDef>
+</file>
+
+<file path=ppt/diagrams/data1.xml><?xml version="1.0" encoding="utf-8"?>
+<dgm:dataModel xmlns:dgm="http://schemas.openxmlformats.org/drawingml/2006/diagram" xmlns:a="http://schemas.openxmlformats.org/drawingml/2006/main">
+  <dgm:ptLst>
+    <dgm:pt modelId="{F32E3E8A-7C50-427F-9105-6CCB0404EBE1}" type="doc">
+      <dgm:prSet loTypeId="urn:microsoft.com/office/officeart/2005/8/layout/process4" loCatId="process" qsTypeId="urn:microsoft.com/office/officeart/2005/8/quickstyle/simple1" qsCatId="simple" csTypeId="urn:microsoft.com/office/officeart/2005/8/colors/colorful2" csCatId="colorful" phldr="1"/>
+      <dgm:spPr/>
+      <dgm:t>
+        <a:bodyPr/>
+        <a:lstStyle/>
+        <a:p>
+          <a:endParaRPr lang="en-US"/>
+        </a:p>
+      </dgm:t>
+    </dgm:pt>
+    <dgm:pt modelId="{120FE57E-3B7E-4053-A845-CB59FB8CDAEB}">
+      <dgm:prSet/>
+      <dgm:spPr/>
+      <dgm:t>
+        <a:bodyPr/>
+        <a:lstStyle/>
+        <a:p>
+          <a:r>
+            <a:rPr lang="en-US"/>
+            <a:t>Introduced briefly in OCN 350; to be used extensively in OCN 479</a:t>
+          </a:r>
+        </a:p>
+      </dgm:t>
+    </dgm:pt>
+    <dgm:pt modelId="{22D3930D-27FB-45DF-8950-62DACA78A7AC}" type="parTrans" cxnId="{044324E6-3E46-4A60-AAB1-99372DFFFBFE}">
+      <dgm:prSet/>
+      <dgm:spPr/>
+      <dgm:t>
+        <a:bodyPr/>
+        <a:lstStyle/>
+        <a:p>
+          <a:endParaRPr lang="en-US"/>
+        </a:p>
+      </dgm:t>
+    </dgm:pt>
+    <dgm:pt modelId="{EAD6855F-85F5-484B-A866-1E7F26546142}" type="sibTrans" cxnId="{044324E6-3E46-4A60-AAB1-99372DFFFBFE}">
+      <dgm:prSet/>
+      <dgm:spPr/>
+      <dgm:t>
+        <a:bodyPr/>
+        <a:lstStyle/>
+        <a:p>
+          <a:endParaRPr lang="en-US"/>
+        </a:p>
+      </dgm:t>
+    </dgm:pt>
+    <dgm:pt modelId="{8657B9D1-19F4-4BD3-9500-E39C39258286}">
+      <dgm:prSet/>
+      <dgm:spPr/>
+      <dgm:t>
+        <a:bodyPr/>
+        <a:lstStyle/>
+        <a:p>
+          <a:r>
+            <a:rPr lang="en-US"/>
+            <a:t>Reinforces “open science and engineering” concepts</a:t>
+          </a:r>
+        </a:p>
+      </dgm:t>
+    </dgm:pt>
+    <dgm:pt modelId="{AB12E6D0-897E-4446-B7DD-7A102A25B650}" type="parTrans" cxnId="{954BF2D3-7386-49D6-9095-A398F6C3D9E0}">
+      <dgm:prSet/>
+      <dgm:spPr/>
+      <dgm:t>
+        <a:bodyPr/>
+        <a:lstStyle/>
+        <a:p>
+          <a:endParaRPr lang="en-US"/>
+        </a:p>
+      </dgm:t>
+    </dgm:pt>
+    <dgm:pt modelId="{671AE598-A5BA-48F5-AB0B-871A82C331E2}" type="sibTrans" cxnId="{954BF2D3-7386-49D6-9095-A398F6C3D9E0}">
+      <dgm:prSet/>
+      <dgm:spPr/>
+      <dgm:t>
+        <a:bodyPr/>
+        <a:lstStyle/>
+        <a:p>
+          <a:endParaRPr lang="en-US"/>
+        </a:p>
+      </dgm:t>
+    </dgm:pt>
+    <dgm:pt modelId="{74CB338A-D8C0-414B-85A1-888DDCF7349B}">
+      <dgm:prSet/>
+      <dgm:spPr/>
+      <dgm:t>
+        <a:bodyPr/>
+        <a:lstStyle/>
+        <a:p>
+          <a:r>
+            <a:rPr lang="en-US" dirty="0"/>
+            <a:t>Enables collaborative coding with a little more code stability than something like google docs. Collaborate with…</a:t>
+          </a:r>
+        </a:p>
+      </dgm:t>
+    </dgm:pt>
+    <dgm:pt modelId="{5FC225DC-50DB-4645-8F53-13610148E4B5}" type="parTrans" cxnId="{A505618A-6523-4408-8051-E70B7C740FB9}">
+      <dgm:prSet/>
+      <dgm:spPr/>
+      <dgm:t>
+        <a:bodyPr/>
+        <a:lstStyle/>
+        <a:p>
+          <a:endParaRPr lang="en-US"/>
+        </a:p>
+      </dgm:t>
+    </dgm:pt>
+    <dgm:pt modelId="{9345FBBE-D3BA-44F9-9FDD-0A82843A84FC}" type="sibTrans" cxnId="{A505618A-6523-4408-8051-E70B7C740FB9}">
+      <dgm:prSet/>
+      <dgm:spPr/>
+      <dgm:t>
+        <a:bodyPr/>
+        <a:lstStyle/>
+        <a:p>
+          <a:endParaRPr lang="en-US"/>
+        </a:p>
+      </dgm:t>
+    </dgm:pt>
+    <dgm:pt modelId="{B8327E9D-2415-4C82-B160-630B79B03BD4}">
+      <dgm:prSet/>
+      <dgm:spPr/>
+      <dgm:t>
+        <a:bodyPr/>
+        <a:lstStyle/>
+        <a:p>
+          <a:r>
+            <a:rPr lang="en-US"/>
+            <a:t>Teammates</a:t>
+          </a:r>
+        </a:p>
+      </dgm:t>
+    </dgm:pt>
+    <dgm:pt modelId="{5F9C8AC2-A65F-4491-A5B7-50BB916E950B}" type="parTrans" cxnId="{F8DDC46E-C24B-488E-8261-6657AFF64492}">
+      <dgm:prSet/>
+      <dgm:spPr/>
+      <dgm:t>
+        <a:bodyPr/>
+        <a:lstStyle/>
+        <a:p>
+          <a:endParaRPr lang="en-US"/>
+        </a:p>
+      </dgm:t>
+    </dgm:pt>
+    <dgm:pt modelId="{538D68A1-FAF4-4ECF-AE59-7651CC9DCF89}" type="sibTrans" cxnId="{F8DDC46E-C24B-488E-8261-6657AFF64492}">
+      <dgm:prSet/>
+      <dgm:spPr/>
+      <dgm:t>
+        <a:bodyPr/>
+        <a:lstStyle/>
+        <a:p>
+          <a:endParaRPr lang="en-US"/>
+        </a:p>
+      </dgm:t>
+    </dgm:pt>
+    <dgm:pt modelId="{A244E86E-AD0F-4B61-8E29-B33E4214D249}">
+      <dgm:prSet/>
+      <dgm:spPr/>
+      <dgm:t>
+        <a:bodyPr/>
+        <a:lstStyle/>
+        <a:p>
+          <a:r>
+            <a:rPr lang="en-US"/>
+            <a:t>Rest of this class</a:t>
+          </a:r>
+        </a:p>
+      </dgm:t>
+    </dgm:pt>
+    <dgm:pt modelId="{F833F030-BF9D-4ECC-AAF1-607ABEB80477}" type="parTrans" cxnId="{B97FDE49-F001-4AB8-B5DF-643DEA04AA30}">
+      <dgm:prSet/>
+      <dgm:spPr/>
+      <dgm:t>
+        <a:bodyPr/>
+        <a:lstStyle/>
+        <a:p>
+          <a:endParaRPr lang="en-US"/>
+        </a:p>
+      </dgm:t>
+    </dgm:pt>
+    <dgm:pt modelId="{7C3F0CC4-5B58-43DA-B818-909E9B6B68D5}" type="sibTrans" cxnId="{B97FDE49-F001-4AB8-B5DF-643DEA04AA30}">
+      <dgm:prSet/>
+      <dgm:spPr/>
+      <dgm:t>
+        <a:bodyPr/>
+        <a:lstStyle/>
+        <a:p>
+          <a:endParaRPr lang="en-US"/>
+        </a:p>
+      </dgm:t>
+    </dgm:pt>
+    <dgm:pt modelId="{38578C42-040D-4291-84C9-5C452801E60F}">
+      <dgm:prSet/>
+      <dgm:spPr/>
+      <dgm:t>
+        <a:bodyPr/>
+        <a:lstStyle/>
+        <a:p>
+          <a:r>
+            <a:rPr lang="en-US"/>
+            <a:t>Future classes</a:t>
+          </a:r>
+        </a:p>
+      </dgm:t>
+    </dgm:pt>
+    <dgm:pt modelId="{2B3A3C10-EE9C-4401-A095-4FD24954E53D}" type="parTrans" cxnId="{A0BA3ECA-F180-4EE2-8EFD-E91628B67F0A}">
+      <dgm:prSet/>
+      <dgm:spPr/>
+      <dgm:t>
+        <a:bodyPr/>
+        <a:lstStyle/>
+        <a:p>
+          <a:endParaRPr lang="en-US"/>
+        </a:p>
+      </dgm:t>
+    </dgm:pt>
+    <dgm:pt modelId="{895ED3BD-8419-4C74-A7DB-9EE6660D28C9}" type="sibTrans" cxnId="{A0BA3ECA-F180-4EE2-8EFD-E91628B67F0A}">
+      <dgm:prSet/>
+      <dgm:spPr/>
+      <dgm:t>
+        <a:bodyPr/>
+        <a:lstStyle/>
+        <a:p>
+          <a:endParaRPr lang="en-US"/>
+        </a:p>
+      </dgm:t>
+    </dgm:pt>
+    <dgm:pt modelId="{FD3E2ED9-D057-47E4-AF90-6C172CD06E7C}">
+      <dgm:prSet/>
+      <dgm:spPr/>
+      <dgm:t>
+        <a:bodyPr/>
+        <a:lstStyle/>
+        <a:p>
+          <a:r>
+            <a:rPr lang="en-US"/>
+            <a:t>People anywhere/anywhen in the world</a:t>
+          </a:r>
+        </a:p>
+      </dgm:t>
+    </dgm:pt>
+    <dgm:pt modelId="{F8E0CDE8-B0AC-4897-ACBF-B6090A39A3EB}" type="parTrans" cxnId="{81D5E088-772F-4A82-9D4F-30BBED6296D0}">
+      <dgm:prSet/>
+      <dgm:spPr/>
+      <dgm:t>
+        <a:bodyPr/>
+        <a:lstStyle/>
+        <a:p>
+          <a:endParaRPr lang="en-US"/>
+        </a:p>
+      </dgm:t>
+    </dgm:pt>
+    <dgm:pt modelId="{72410B1D-D7F9-4F54-8602-CDA331A84213}" type="sibTrans" cxnId="{81D5E088-772F-4A82-9D4F-30BBED6296D0}">
+      <dgm:prSet/>
+      <dgm:spPr/>
+      <dgm:t>
+        <a:bodyPr/>
+        <a:lstStyle/>
+        <a:p>
+          <a:endParaRPr lang="en-US"/>
+        </a:p>
+      </dgm:t>
+    </dgm:pt>
+    <dgm:pt modelId="{D5523D48-CF18-42D4-9AA0-3441C4900D9E}">
+      <dgm:prSet/>
+      <dgm:spPr/>
+      <dgm:t>
+        <a:bodyPr/>
+        <a:lstStyle/>
+        <a:p>
+          <a:r>
+            <a:rPr lang="en-US"/>
+            <a:t>Including links to GitHub repos on resumes/CVs will be very attractive to employers/graduate schools!</a:t>
+          </a:r>
+        </a:p>
+      </dgm:t>
+    </dgm:pt>
+    <dgm:pt modelId="{854BD8E0-2851-40FF-964B-78AA55C0F9FD}" type="parTrans" cxnId="{2C72C4B3-D037-4DA5-A773-C93949B39D1C}">
+      <dgm:prSet/>
+      <dgm:spPr/>
+      <dgm:t>
+        <a:bodyPr/>
+        <a:lstStyle/>
+        <a:p>
+          <a:endParaRPr lang="en-US"/>
+        </a:p>
+      </dgm:t>
+    </dgm:pt>
+    <dgm:pt modelId="{51B38E78-0726-4C2C-A0E0-769DF7FC1B3B}" type="sibTrans" cxnId="{2C72C4B3-D037-4DA5-A773-C93949B39D1C}">
+      <dgm:prSet/>
+      <dgm:spPr/>
+      <dgm:t>
+        <a:bodyPr/>
+        <a:lstStyle/>
+        <a:p>
+          <a:endParaRPr lang="en-US"/>
+        </a:p>
+      </dgm:t>
+    </dgm:pt>
+    <dgm:pt modelId="{5DD754C2-8AE2-674E-AA44-F0CF0A602279}" type="pres">
+      <dgm:prSet presAssocID="{F32E3E8A-7C50-427F-9105-6CCB0404EBE1}" presName="Name0" presStyleCnt="0">
+        <dgm:presLayoutVars>
+          <dgm:dir/>
+          <dgm:animLvl val="lvl"/>
+          <dgm:resizeHandles val="exact"/>
+        </dgm:presLayoutVars>
+      </dgm:prSet>
+      <dgm:spPr/>
+    </dgm:pt>
+    <dgm:pt modelId="{B34BB556-3215-7D4E-BA4F-B2AFEBF203B9}" type="pres">
+      <dgm:prSet presAssocID="{D5523D48-CF18-42D4-9AA0-3441C4900D9E}" presName="boxAndChildren" presStyleCnt="0"/>
+      <dgm:spPr/>
+    </dgm:pt>
+    <dgm:pt modelId="{BEF810A7-2669-DB4C-80FA-4D82276C54C7}" type="pres">
+      <dgm:prSet presAssocID="{D5523D48-CF18-42D4-9AA0-3441C4900D9E}" presName="parentTextBox" presStyleLbl="node1" presStyleIdx="0" presStyleCnt="4"/>
+      <dgm:spPr/>
+    </dgm:pt>
+    <dgm:pt modelId="{69963075-9382-7040-8CD4-426244936E9E}" type="pres">
+      <dgm:prSet presAssocID="{9345FBBE-D3BA-44F9-9FDD-0A82843A84FC}" presName="sp" presStyleCnt="0"/>
+      <dgm:spPr/>
+    </dgm:pt>
+    <dgm:pt modelId="{412DBBA2-BFA3-2345-83FB-5FCFE78640A4}" type="pres">
+      <dgm:prSet presAssocID="{74CB338A-D8C0-414B-85A1-888DDCF7349B}" presName="arrowAndChildren" presStyleCnt="0"/>
+      <dgm:spPr/>
+    </dgm:pt>
+    <dgm:pt modelId="{E79D9A2B-E768-9747-89BB-A9D6528154FC}" type="pres">
+      <dgm:prSet presAssocID="{74CB338A-D8C0-414B-85A1-888DDCF7349B}" presName="parentTextArrow" presStyleLbl="node1" presStyleIdx="0" presStyleCnt="4"/>
+      <dgm:spPr/>
+    </dgm:pt>
+    <dgm:pt modelId="{A5C47B43-55AC-A648-AC59-2D40681500B5}" type="pres">
+      <dgm:prSet presAssocID="{74CB338A-D8C0-414B-85A1-888DDCF7349B}" presName="arrow" presStyleLbl="node1" presStyleIdx="1" presStyleCnt="4"/>
+      <dgm:spPr/>
+    </dgm:pt>
+    <dgm:pt modelId="{0A2919C0-BB74-9540-848F-9D03EA2290E1}" type="pres">
+      <dgm:prSet presAssocID="{74CB338A-D8C0-414B-85A1-888DDCF7349B}" presName="descendantArrow" presStyleCnt="0"/>
+      <dgm:spPr/>
+    </dgm:pt>
+    <dgm:pt modelId="{8FF7A8D2-0FC1-BD4E-822E-D06A34BDB57B}" type="pres">
+      <dgm:prSet presAssocID="{B8327E9D-2415-4C82-B160-630B79B03BD4}" presName="childTextArrow" presStyleLbl="fgAccFollowNode1" presStyleIdx="0" presStyleCnt="4">
+        <dgm:presLayoutVars>
+          <dgm:bulletEnabled val="1"/>
+        </dgm:presLayoutVars>
+      </dgm:prSet>
+      <dgm:spPr/>
+    </dgm:pt>
+    <dgm:pt modelId="{B801BFA6-D690-604F-A363-8D12B753AAE6}" type="pres">
+      <dgm:prSet presAssocID="{A244E86E-AD0F-4B61-8E29-B33E4214D249}" presName="childTextArrow" presStyleLbl="fgAccFollowNode1" presStyleIdx="1" presStyleCnt="4">
+        <dgm:presLayoutVars>
+          <dgm:bulletEnabled val="1"/>
+        </dgm:presLayoutVars>
+      </dgm:prSet>
+      <dgm:spPr/>
+    </dgm:pt>
+    <dgm:pt modelId="{5D0FAAC0-E80C-6F4C-B991-461536F28030}" type="pres">
+      <dgm:prSet presAssocID="{38578C42-040D-4291-84C9-5C452801E60F}" presName="childTextArrow" presStyleLbl="fgAccFollowNode1" presStyleIdx="2" presStyleCnt="4">
+        <dgm:presLayoutVars>
+          <dgm:bulletEnabled val="1"/>
+        </dgm:presLayoutVars>
+      </dgm:prSet>
+      <dgm:spPr/>
+    </dgm:pt>
+    <dgm:pt modelId="{72F0CC84-945D-3F44-9A5E-B0831EAD2D33}" type="pres">
+      <dgm:prSet presAssocID="{FD3E2ED9-D057-47E4-AF90-6C172CD06E7C}" presName="childTextArrow" presStyleLbl="fgAccFollowNode1" presStyleIdx="3" presStyleCnt="4">
+        <dgm:presLayoutVars>
+          <dgm:bulletEnabled val="1"/>
+        </dgm:presLayoutVars>
+      </dgm:prSet>
+      <dgm:spPr/>
+    </dgm:pt>
+    <dgm:pt modelId="{E93FFBC6-BB08-D54F-9E92-03B9B2459CC0}" type="pres">
+      <dgm:prSet presAssocID="{671AE598-A5BA-48F5-AB0B-871A82C331E2}" presName="sp" presStyleCnt="0"/>
+      <dgm:spPr/>
+    </dgm:pt>
+    <dgm:pt modelId="{3618FC2E-5C0B-D44A-91EC-120B3AC8A819}" type="pres">
+      <dgm:prSet presAssocID="{8657B9D1-19F4-4BD3-9500-E39C39258286}" presName="arrowAndChildren" presStyleCnt="0"/>
+      <dgm:spPr/>
+    </dgm:pt>
+    <dgm:pt modelId="{4A6189C4-F783-F448-8EE2-C624E136F3EF}" type="pres">
+      <dgm:prSet presAssocID="{8657B9D1-19F4-4BD3-9500-E39C39258286}" presName="parentTextArrow" presStyleLbl="node1" presStyleIdx="2" presStyleCnt="4"/>
+      <dgm:spPr/>
+    </dgm:pt>
+    <dgm:pt modelId="{C741C33E-DBDC-504A-84CC-D9D9964EA142}" type="pres">
+      <dgm:prSet presAssocID="{EAD6855F-85F5-484B-A866-1E7F26546142}" presName="sp" presStyleCnt="0"/>
+      <dgm:spPr/>
+    </dgm:pt>
+    <dgm:pt modelId="{AD047D99-2D57-4648-817A-CAC3C1F7FC48}" type="pres">
+      <dgm:prSet presAssocID="{120FE57E-3B7E-4053-A845-CB59FB8CDAEB}" presName="arrowAndChildren" presStyleCnt="0"/>
+      <dgm:spPr/>
+    </dgm:pt>
+    <dgm:pt modelId="{7ABA7142-BFD6-DD46-A5B2-AB2C97ADAB8D}" type="pres">
+      <dgm:prSet presAssocID="{120FE57E-3B7E-4053-A845-CB59FB8CDAEB}" presName="parentTextArrow" presStyleLbl="node1" presStyleIdx="3" presStyleCnt="4"/>
+      <dgm:spPr/>
+    </dgm:pt>
+  </dgm:ptLst>
+  <dgm:cxnLst>
+    <dgm:cxn modelId="{E1033804-1533-AC4B-8D16-22D78E6AB5DB}" type="presOf" srcId="{FD3E2ED9-D057-47E4-AF90-6C172CD06E7C}" destId="{72F0CC84-945D-3F44-9A5E-B0831EAD2D33}" srcOrd="0" destOrd="0" presId="urn:microsoft.com/office/officeart/2005/8/layout/process4"/>
+    <dgm:cxn modelId="{D97A1317-C770-DB46-B79B-E1401AB508B0}" type="presOf" srcId="{74CB338A-D8C0-414B-85A1-888DDCF7349B}" destId="{A5C47B43-55AC-A648-AC59-2D40681500B5}" srcOrd="1" destOrd="0" presId="urn:microsoft.com/office/officeart/2005/8/layout/process4"/>
+    <dgm:cxn modelId="{BFA12C38-2FC5-4A43-AFCA-F5142C4F7AC7}" type="presOf" srcId="{F32E3E8A-7C50-427F-9105-6CCB0404EBE1}" destId="{5DD754C2-8AE2-674E-AA44-F0CF0A602279}" srcOrd="0" destOrd="0" presId="urn:microsoft.com/office/officeart/2005/8/layout/process4"/>
+    <dgm:cxn modelId="{75FA7D3F-8EB5-B04A-8ED9-41EF10290251}" type="presOf" srcId="{D5523D48-CF18-42D4-9AA0-3441C4900D9E}" destId="{BEF810A7-2669-DB4C-80FA-4D82276C54C7}" srcOrd="0" destOrd="0" presId="urn:microsoft.com/office/officeart/2005/8/layout/process4"/>
+    <dgm:cxn modelId="{28B24548-1CED-FE44-A617-23A179B03882}" type="presOf" srcId="{120FE57E-3B7E-4053-A845-CB59FB8CDAEB}" destId="{7ABA7142-BFD6-DD46-A5B2-AB2C97ADAB8D}" srcOrd="0" destOrd="0" presId="urn:microsoft.com/office/officeart/2005/8/layout/process4"/>
+    <dgm:cxn modelId="{B97FDE49-F001-4AB8-B5DF-643DEA04AA30}" srcId="{74CB338A-D8C0-414B-85A1-888DDCF7349B}" destId="{A244E86E-AD0F-4B61-8E29-B33E4214D249}" srcOrd="1" destOrd="0" parTransId="{F833F030-BF9D-4ECC-AAF1-607ABEB80477}" sibTransId="{7C3F0CC4-5B58-43DA-B818-909E9B6B68D5}"/>
+    <dgm:cxn modelId="{F8DDC46E-C24B-488E-8261-6657AFF64492}" srcId="{74CB338A-D8C0-414B-85A1-888DDCF7349B}" destId="{B8327E9D-2415-4C82-B160-630B79B03BD4}" srcOrd="0" destOrd="0" parTransId="{5F9C8AC2-A65F-4491-A5B7-50BB916E950B}" sibTransId="{538D68A1-FAF4-4ECF-AE59-7651CC9DCF89}"/>
+    <dgm:cxn modelId="{81D5E088-772F-4A82-9D4F-30BBED6296D0}" srcId="{74CB338A-D8C0-414B-85A1-888DDCF7349B}" destId="{FD3E2ED9-D057-47E4-AF90-6C172CD06E7C}" srcOrd="3" destOrd="0" parTransId="{F8E0CDE8-B0AC-4897-ACBF-B6090A39A3EB}" sibTransId="{72410B1D-D7F9-4F54-8602-CDA331A84213}"/>
+    <dgm:cxn modelId="{A505618A-6523-4408-8051-E70B7C740FB9}" srcId="{F32E3E8A-7C50-427F-9105-6CCB0404EBE1}" destId="{74CB338A-D8C0-414B-85A1-888DDCF7349B}" srcOrd="2" destOrd="0" parTransId="{5FC225DC-50DB-4645-8F53-13610148E4B5}" sibTransId="{9345FBBE-D3BA-44F9-9FDD-0A82843A84FC}"/>
+    <dgm:cxn modelId="{93FFB79F-8D23-134F-87A2-A3C78159C4CA}" type="presOf" srcId="{A244E86E-AD0F-4B61-8E29-B33E4214D249}" destId="{B801BFA6-D690-604F-A363-8D12B753AAE6}" srcOrd="0" destOrd="0" presId="urn:microsoft.com/office/officeart/2005/8/layout/process4"/>
+    <dgm:cxn modelId="{1ED345A5-2A01-C944-9879-A816552C3376}" type="presOf" srcId="{74CB338A-D8C0-414B-85A1-888DDCF7349B}" destId="{E79D9A2B-E768-9747-89BB-A9D6528154FC}" srcOrd="0" destOrd="0" presId="urn:microsoft.com/office/officeart/2005/8/layout/process4"/>
+    <dgm:cxn modelId="{2C72C4B3-D037-4DA5-A773-C93949B39D1C}" srcId="{F32E3E8A-7C50-427F-9105-6CCB0404EBE1}" destId="{D5523D48-CF18-42D4-9AA0-3441C4900D9E}" srcOrd="3" destOrd="0" parTransId="{854BD8E0-2851-40FF-964B-78AA55C0F9FD}" sibTransId="{51B38E78-0726-4C2C-A0E0-769DF7FC1B3B}"/>
+    <dgm:cxn modelId="{EB4E91B6-490D-E244-95E9-59FF93F126AD}" type="presOf" srcId="{B8327E9D-2415-4C82-B160-630B79B03BD4}" destId="{8FF7A8D2-0FC1-BD4E-822E-D06A34BDB57B}" srcOrd="0" destOrd="0" presId="urn:microsoft.com/office/officeart/2005/8/layout/process4"/>
+    <dgm:cxn modelId="{FF9767C8-37D9-E544-8A13-F65FF2A9F785}" type="presOf" srcId="{8657B9D1-19F4-4BD3-9500-E39C39258286}" destId="{4A6189C4-F783-F448-8EE2-C624E136F3EF}" srcOrd="0" destOrd="0" presId="urn:microsoft.com/office/officeart/2005/8/layout/process4"/>
+    <dgm:cxn modelId="{A0BA3ECA-F180-4EE2-8EFD-E91628B67F0A}" srcId="{74CB338A-D8C0-414B-85A1-888DDCF7349B}" destId="{38578C42-040D-4291-84C9-5C452801E60F}" srcOrd="2" destOrd="0" parTransId="{2B3A3C10-EE9C-4401-A095-4FD24954E53D}" sibTransId="{895ED3BD-8419-4C74-A7DB-9EE6660D28C9}"/>
+    <dgm:cxn modelId="{954BF2D3-7386-49D6-9095-A398F6C3D9E0}" srcId="{F32E3E8A-7C50-427F-9105-6CCB0404EBE1}" destId="{8657B9D1-19F4-4BD3-9500-E39C39258286}" srcOrd="1" destOrd="0" parTransId="{AB12E6D0-897E-4446-B7DD-7A102A25B650}" sibTransId="{671AE598-A5BA-48F5-AB0B-871A82C331E2}"/>
+    <dgm:cxn modelId="{044324E6-3E46-4A60-AAB1-99372DFFFBFE}" srcId="{F32E3E8A-7C50-427F-9105-6CCB0404EBE1}" destId="{120FE57E-3B7E-4053-A845-CB59FB8CDAEB}" srcOrd="0" destOrd="0" parTransId="{22D3930D-27FB-45DF-8950-62DACA78A7AC}" sibTransId="{EAD6855F-85F5-484B-A866-1E7F26546142}"/>
+    <dgm:cxn modelId="{52AA1DED-6E4B-F846-9FA1-711F9865E304}" type="presOf" srcId="{38578C42-040D-4291-84C9-5C452801E60F}" destId="{5D0FAAC0-E80C-6F4C-B991-461536F28030}" srcOrd="0" destOrd="0" presId="urn:microsoft.com/office/officeart/2005/8/layout/process4"/>
+    <dgm:cxn modelId="{59AAFD85-1F5F-0747-872F-931E665622D6}" type="presParOf" srcId="{5DD754C2-8AE2-674E-AA44-F0CF0A602279}" destId="{B34BB556-3215-7D4E-BA4F-B2AFEBF203B9}" srcOrd="0" destOrd="0" presId="urn:microsoft.com/office/officeart/2005/8/layout/process4"/>
+    <dgm:cxn modelId="{88887381-55BA-3F44-8FE6-B80A94D5C83F}" type="presParOf" srcId="{B34BB556-3215-7D4E-BA4F-B2AFEBF203B9}" destId="{BEF810A7-2669-DB4C-80FA-4D82276C54C7}" srcOrd="0" destOrd="0" presId="urn:microsoft.com/office/officeart/2005/8/layout/process4"/>
+    <dgm:cxn modelId="{86827A70-51DB-194F-B04E-B695DF5F8175}" type="presParOf" srcId="{5DD754C2-8AE2-674E-AA44-F0CF0A602279}" destId="{69963075-9382-7040-8CD4-426244936E9E}" srcOrd="1" destOrd="0" presId="urn:microsoft.com/office/officeart/2005/8/layout/process4"/>
+    <dgm:cxn modelId="{21ACF9E1-4E0B-CA43-BB43-95D9835C96F1}" type="presParOf" srcId="{5DD754C2-8AE2-674E-AA44-F0CF0A602279}" destId="{412DBBA2-BFA3-2345-83FB-5FCFE78640A4}" srcOrd="2" destOrd="0" presId="urn:microsoft.com/office/officeart/2005/8/layout/process4"/>
+    <dgm:cxn modelId="{522E77EC-5277-CD42-932A-5BD7A0530506}" type="presParOf" srcId="{412DBBA2-BFA3-2345-83FB-5FCFE78640A4}" destId="{E79D9A2B-E768-9747-89BB-A9D6528154FC}" srcOrd="0" destOrd="0" presId="urn:microsoft.com/office/officeart/2005/8/layout/process4"/>
+    <dgm:cxn modelId="{BF69BD9F-B884-0040-94CF-0986C25E0485}" type="presParOf" srcId="{412DBBA2-BFA3-2345-83FB-5FCFE78640A4}" destId="{A5C47B43-55AC-A648-AC59-2D40681500B5}" srcOrd="1" destOrd="0" presId="urn:microsoft.com/office/officeart/2005/8/layout/process4"/>
+    <dgm:cxn modelId="{306D130E-E64D-AC40-8076-43B4959ED09A}" type="presParOf" srcId="{412DBBA2-BFA3-2345-83FB-5FCFE78640A4}" destId="{0A2919C0-BB74-9540-848F-9D03EA2290E1}" srcOrd="2" destOrd="0" presId="urn:microsoft.com/office/officeart/2005/8/layout/process4"/>
+    <dgm:cxn modelId="{7D9C41E2-A8D0-B147-9D4A-65B01C2B32F5}" type="presParOf" srcId="{0A2919C0-BB74-9540-848F-9D03EA2290E1}" destId="{8FF7A8D2-0FC1-BD4E-822E-D06A34BDB57B}" srcOrd="0" destOrd="0" presId="urn:microsoft.com/office/officeart/2005/8/layout/process4"/>
+    <dgm:cxn modelId="{A2F42205-CCAE-8844-BE11-13D74F0ED88D}" type="presParOf" srcId="{0A2919C0-BB74-9540-848F-9D03EA2290E1}" destId="{B801BFA6-D690-604F-A363-8D12B753AAE6}" srcOrd="1" destOrd="0" presId="urn:microsoft.com/office/officeart/2005/8/layout/process4"/>
+    <dgm:cxn modelId="{8BBF33C1-6D59-5242-BF0B-634A70E87A33}" type="presParOf" srcId="{0A2919C0-BB74-9540-848F-9D03EA2290E1}" destId="{5D0FAAC0-E80C-6F4C-B991-461536F28030}" srcOrd="2" destOrd="0" presId="urn:microsoft.com/office/officeart/2005/8/layout/process4"/>
+    <dgm:cxn modelId="{D3E5D192-087C-F948-9FCE-92620274AA6D}" type="presParOf" srcId="{0A2919C0-BB74-9540-848F-9D03EA2290E1}" destId="{72F0CC84-945D-3F44-9A5E-B0831EAD2D33}" srcOrd="3" destOrd="0" presId="urn:microsoft.com/office/officeart/2005/8/layout/process4"/>
+    <dgm:cxn modelId="{01773E1B-9E8E-F94A-A0EC-1E64C19891AA}" type="presParOf" srcId="{5DD754C2-8AE2-674E-AA44-F0CF0A602279}" destId="{E93FFBC6-BB08-D54F-9E92-03B9B2459CC0}" srcOrd="3" destOrd="0" presId="urn:microsoft.com/office/officeart/2005/8/layout/process4"/>
+    <dgm:cxn modelId="{958129D1-4520-7043-8AE3-F01543BA201E}" type="presParOf" srcId="{5DD754C2-8AE2-674E-AA44-F0CF0A602279}" destId="{3618FC2E-5C0B-D44A-91EC-120B3AC8A819}" srcOrd="4" destOrd="0" presId="urn:microsoft.com/office/officeart/2005/8/layout/process4"/>
+    <dgm:cxn modelId="{7346557F-8457-3F46-B027-7485D2E21903}" type="presParOf" srcId="{3618FC2E-5C0B-D44A-91EC-120B3AC8A819}" destId="{4A6189C4-F783-F448-8EE2-C624E136F3EF}" srcOrd="0" destOrd="0" presId="urn:microsoft.com/office/officeart/2005/8/layout/process4"/>
+    <dgm:cxn modelId="{7393BCEC-4A09-484D-B3ED-121DD31D8F3A}" type="presParOf" srcId="{5DD754C2-8AE2-674E-AA44-F0CF0A602279}" destId="{C741C33E-DBDC-504A-84CC-D9D9964EA142}" srcOrd="5" destOrd="0" presId="urn:microsoft.com/office/officeart/2005/8/layout/process4"/>
+    <dgm:cxn modelId="{538D949C-EB05-3444-87CD-1E6D10A25685}" type="presParOf" srcId="{5DD754C2-8AE2-674E-AA44-F0CF0A602279}" destId="{AD047D99-2D57-4648-817A-CAC3C1F7FC48}" srcOrd="6" destOrd="0" presId="urn:microsoft.com/office/officeart/2005/8/layout/process4"/>
+    <dgm:cxn modelId="{131172CC-C04D-5F41-89CC-B6C3DBA82603}" type="presParOf" srcId="{AD047D99-2D57-4648-817A-CAC3C1F7FC48}" destId="{7ABA7142-BFD6-DD46-A5B2-AB2C97ADAB8D}" srcOrd="0" destOrd="0" presId="urn:microsoft.com/office/officeart/2005/8/layout/process4"/>
+  </dgm:cxnLst>
+  <dgm:bg/>
+  <dgm:whole/>
+  <dgm:extLst>
+    <a:ext uri="http://schemas.microsoft.com/office/drawing/2008/diagram">
+      <dsp:dataModelExt xmlns:dsp="http://schemas.microsoft.com/office/drawing/2008/diagram" relId="rId6" minVer="http://schemas.openxmlformats.org/drawingml/2006/diagram"/>
+    </a:ext>
+  </dgm:extLst>
+</dgm:dataModel>
+</file>
+
+<file path=ppt/diagrams/drawing1.xml><?xml version="1.0" encoding="utf-8"?>
+<dsp:drawing xmlns:dgm="http://schemas.openxmlformats.org/drawingml/2006/diagram" xmlns:dsp="http://schemas.microsoft.com/office/drawing/2008/diagram" xmlns:a="http://schemas.openxmlformats.org/drawingml/2006/main">
+  <dsp:spTree>
+    <dsp:nvGrpSpPr>
+      <dsp:cNvPr id="0" name=""/>
+      <dsp:cNvGrpSpPr/>
+    </dsp:nvGrpSpPr>
+    <dsp:grpSpPr/>
+    <dsp:sp modelId="{BEF810A7-2669-DB4C-80FA-4D82276C54C7}">
+      <dsp:nvSpPr>
+        <dsp:cNvPr id="0" name=""/>
+        <dsp:cNvSpPr/>
+      </dsp:nvSpPr>
+      <dsp:spPr>
+        <a:xfrm>
+          <a:off x="0" y="3357542"/>
+          <a:ext cx="9618133" cy="734548"/>
+        </a:xfrm>
+        <a:prstGeom prst="rect">
+          <a:avLst/>
+        </a:prstGeom>
+        <a:solidFill>
+          <a:schemeClr val="accent2">
+            <a:hueOff val="0"/>
+            <a:satOff val="0"/>
+            <a:lumOff val="0"/>
+            <a:alphaOff val="0"/>
+          </a:schemeClr>
+        </a:solidFill>
+        <a:ln w="19050" cap="rnd" cmpd="sng" algn="ctr">
+          <a:solidFill>
+            <a:schemeClr val="lt1">
+              <a:hueOff val="0"/>
+              <a:satOff val="0"/>
+              <a:lumOff val="0"/>
+              <a:alphaOff val="0"/>
+            </a:schemeClr>
+          </a:solidFill>
+          <a:prstDash val="solid"/>
+        </a:ln>
+        <a:effectLst/>
+      </dsp:spPr>
+      <dsp:style>
+        <a:lnRef idx="2">
+          <a:scrgbClr r="0" g="0" b="0"/>
+        </a:lnRef>
+        <a:fillRef idx="1">
+          <a:scrgbClr r="0" g="0" b="0"/>
+        </a:fillRef>
+        <a:effectRef idx="0">
+          <a:scrgbClr r="0" g="0" b="0"/>
+        </a:effectRef>
+        <a:fontRef idx="minor">
+          <a:schemeClr val="lt1"/>
+        </a:fontRef>
+      </dsp:style>
+      <dsp:txBody>
+        <a:bodyPr spcFirstLastPara="0" vert="horz" wrap="square" lIns="99568" tIns="99568" rIns="99568" bIns="99568" numCol="1" spcCol="1270" anchor="ctr" anchorCtr="0">
+          <a:noAutofit/>
+        </a:bodyPr>
+        <a:lstStyle/>
+        <a:p>
+          <a:pPr marL="0" lvl="0" indent="0" algn="ctr" defTabSz="622300">
+            <a:lnSpc>
+              <a:spcPct val="90000"/>
+            </a:lnSpc>
+            <a:spcBef>
+              <a:spcPct val="0"/>
+            </a:spcBef>
+            <a:spcAft>
+              <a:spcPct val="35000"/>
+            </a:spcAft>
+            <a:buNone/>
+          </a:pPr>
+          <a:r>
+            <a:rPr lang="en-US" sz="1400" kern="1200"/>
+            <a:t>Including links to GitHub repos on resumes/CVs will be very attractive to employers/graduate schools!</a:t>
+          </a:r>
+        </a:p>
+      </dsp:txBody>
+      <dsp:txXfrm>
+        <a:off x="0" y="3357542"/>
+        <a:ext cx="9618133" cy="734548"/>
+      </dsp:txXfrm>
+    </dsp:sp>
+    <dsp:sp modelId="{A5C47B43-55AC-A648-AC59-2D40681500B5}">
+      <dsp:nvSpPr>
+        <dsp:cNvPr id="0" name=""/>
+        <dsp:cNvSpPr/>
+      </dsp:nvSpPr>
+      <dsp:spPr>
+        <a:xfrm rot="10800000">
+          <a:off x="0" y="2238825"/>
+          <a:ext cx="9618133" cy="1129735"/>
+        </a:xfrm>
+        <a:prstGeom prst="upArrowCallout">
+          <a:avLst/>
+        </a:prstGeom>
+        <a:solidFill>
+          <a:schemeClr val="accent2">
+            <a:hueOff val="-988095"/>
+            <a:satOff val="4733"/>
+            <a:lumOff val="4379"/>
+            <a:alphaOff val="0"/>
+          </a:schemeClr>
+        </a:solidFill>
+        <a:ln w="19050" cap="rnd" cmpd="sng" algn="ctr">
+          <a:solidFill>
+            <a:schemeClr val="lt1">
+              <a:hueOff val="0"/>
+              <a:satOff val="0"/>
+              <a:lumOff val="0"/>
+              <a:alphaOff val="0"/>
+            </a:schemeClr>
+          </a:solidFill>
+          <a:prstDash val="solid"/>
+        </a:ln>
+        <a:effectLst/>
+      </dsp:spPr>
+      <dsp:style>
+        <a:lnRef idx="2">
+          <a:scrgbClr r="0" g="0" b="0"/>
+        </a:lnRef>
+        <a:fillRef idx="1">
+          <a:scrgbClr r="0" g="0" b="0"/>
+        </a:fillRef>
+        <a:effectRef idx="0">
+          <a:scrgbClr r="0" g="0" b="0"/>
+        </a:effectRef>
+        <a:fontRef idx="minor">
+          <a:schemeClr val="lt1"/>
+        </a:fontRef>
+      </dsp:style>
+      <dsp:txBody>
+        <a:bodyPr spcFirstLastPara="0" vert="horz" wrap="square" lIns="99568" tIns="99568" rIns="99568" bIns="99568" numCol="1" spcCol="1270" anchor="ctr" anchorCtr="0">
+          <a:noAutofit/>
+        </a:bodyPr>
+        <a:lstStyle/>
+        <a:p>
+          <a:pPr marL="0" lvl="0" indent="0" algn="ctr" defTabSz="622300">
+            <a:lnSpc>
+              <a:spcPct val="90000"/>
+            </a:lnSpc>
+            <a:spcBef>
+              <a:spcPct val="0"/>
+            </a:spcBef>
+            <a:spcAft>
+              <a:spcPct val="35000"/>
+            </a:spcAft>
+            <a:buNone/>
+          </a:pPr>
+          <a:r>
+            <a:rPr lang="en-US" sz="1400" kern="1200" dirty="0"/>
+            <a:t>Enables collaborative coding with a little more code stability than something like google docs. Collaborate with…</a:t>
+          </a:r>
+        </a:p>
+      </dsp:txBody>
+      <dsp:txXfrm rot="-10800000">
+        <a:off x="0" y="2238825"/>
+        <a:ext cx="9618133" cy="396537"/>
+      </dsp:txXfrm>
+    </dsp:sp>
+    <dsp:sp modelId="{8FF7A8D2-0FC1-BD4E-822E-D06A34BDB57B}">
+      <dsp:nvSpPr>
+        <dsp:cNvPr id="0" name=""/>
+        <dsp:cNvSpPr/>
+      </dsp:nvSpPr>
+      <dsp:spPr>
+        <a:xfrm>
+          <a:off x="0" y="2635362"/>
+          <a:ext cx="2404533" cy="337790"/>
+        </a:xfrm>
+        <a:prstGeom prst="rect">
+          <a:avLst/>
+        </a:prstGeom>
+        <a:solidFill>
+          <a:schemeClr val="accent2">
+            <a:tint val="40000"/>
+            <a:alpha val="90000"/>
+            <a:hueOff val="0"/>
+            <a:satOff val="0"/>
+            <a:lumOff val="0"/>
+            <a:alphaOff val="0"/>
+          </a:schemeClr>
+        </a:solidFill>
+        <a:ln w="19050" cap="rnd" cmpd="sng" algn="ctr">
+          <a:solidFill>
+            <a:schemeClr val="accent2">
+              <a:tint val="40000"/>
+              <a:alpha val="90000"/>
+              <a:hueOff val="0"/>
+              <a:satOff val="0"/>
+              <a:lumOff val="0"/>
+              <a:alphaOff val="0"/>
+            </a:schemeClr>
+          </a:solidFill>
+          <a:prstDash val="solid"/>
+        </a:ln>
+        <a:effectLst/>
+      </dsp:spPr>
+      <dsp:style>
+        <a:lnRef idx="2">
+          <a:scrgbClr r="0" g="0" b="0"/>
+        </a:lnRef>
+        <a:fillRef idx="1">
+          <a:scrgbClr r="0" g="0" b="0"/>
+        </a:fillRef>
+        <a:effectRef idx="0">
+          <a:scrgbClr r="0" g="0" b="0"/>
+        </a:effectRef>
+        <a:fontRef idx="minor"/>
+      </dsp:style>
+      <dsp:txBody>
+        <a:bodyPr spcFirstLastPara="0" vert="horz" wrap="square" lIns="78232" tIns="13970" rIns="78232" bIns="13970" numCol="1" spcCol="1270" anchor="ctr" anchorCtr="0">
+          <a:noAutofit/>
+        </a:bodyPr>
+        <a:lstStyle/>
+        <a:p>
+          <a:pPr marL="0" lvl="0" indent="0" algn="ctr" defTabSz="488950">
+            <a:lnSpc>
+              <a:spcPct val="90000"/>
+            </a:lnSpc>
+            <a:spcBef>
+              <a:spcPct val="0"/>
+            </a:spcBef>
+            <a:spcAft>
+              <a:spcPct val="35000"/>
+            </a:spcAft>
+            <a:buNone/>
+          </a:pPr>
+          <a:r>
+            <a:rPr lang="en-US" sz="1100" kern="1200"/>
+            <a:t>Teammates</a:t>
+          </a:r>
+        </a:p>
+      </dsp:txBody>
+      <dsp:txXfrm>
+        <a:off x="0" y="2635362"/>
+        <a:ext cx="2404533" cy="337790"/>
+      </dsp:txXfrm>
+    </dsp:sp>
+    <dsp:sp modelId="{B801BFA6-D690-604F-A363-8D12B753AAE6}">
+      <dsp:nvSpPr>
+        <dsp:cNvPr id="0" name=""/>
+        <dsp:cNvSpPr/>
+      </dsp:nvSpPr>
+      <dsp:spPr>
+        <a:xfrm>
+          <a:off x="2404533" y="2635362"/>
+          <a:ext cx="2404533" cy="337790"/>
+        </a:xfrm>
+        <a:prstGeom prst="rect">
+          <a:avLst/>
+        </a:prstGeom>
+        <a:solidFill>
+          <a:schemeClr val="accent2">
+            <a:tint val="40000"/>
+            <a:alpha val="90000"/>
+            <a:hueOff val="-1363945"/>
+            <a:satOff val="15036"/>
+            <a:lumOff val="1432"/>
+            <a:alphaOff val="0"/>
+          </a:schemeClr>
+        </a:solidFill>
+        <a:ln w="19050" cap="rnd" cmpd="sng" algn="ctr">
+          <a:solidFill>
+            <a:schemeClr val="accent2">
+              <a:tint val="40000"/>
+              <a:alpha val="90000"/>
+              <a:hueOff val="-1363945"/>
+              <a:satOff val="15036"/>
+              <a:lumOff val="1432"/>
+              <a:alphaOff val="0"/>
+            </a:schemeClr>
+          </a:solidFill>
+          <a:prstDash val="solid"/>
+        </a:ln>
+        <a:effectLst/>
+      </dsp:spPr>
+      <dsp:style>
+        <a:lnRef idx="2">
+          <a:scrgbClr r="0" g="0" b="0"/>
+        </a:lnRef>
+        <a:fillRef idx="1">
+          <a:scrgbClr r="0" g="0" b="0"/>
+        </a:fillRef>
+        <a:effectRef idx="0">
+          <a:scrgbClr r="0" g="0" b="0"/>
+        </a:effectRef>
+        <a:fontRef idx="minor"/>
+      </dsp:style>
+      <dsp:txBody>
+        <a:bodyPr spcFirstLastPara="0" vert="horz" wrap="square" lIns="78232" tIns="13970" rIns="78232" bIns="13970" numCol="1" spcCol="1270" anchor="ctr" anchorCtr="0">
+          <a:noAutofit/>
+        </a:bodyPr>
+        <a:lstStyle/>
+        <a:p>
+          <a:pPr marL="0" lvl="0" indent="0" algn="ctr" defTabSz="488950">
+            <a:lnSpc>
+              <a:spcPct val="90000"/>
+            </a:lnSpc>
+            <a:spcBef>
+              <a:spcPct val="0"/>
+            </a:spcBef>
+            <a:spcAft>
+              <a:spcPct val="35000"/>
+            </a:spcAft>
+            <a:buNone/>
+          </a:pPr>
+          <a:r>
+            <a:rPr lang="en-US" sz="1100" kern="1200"/>
+            <a:t>Rest of this class</a:t>
+          </a:r>
+        </a:p>
+      </dsp:txBody>
+      <dsp:txXfrm>
+        <a:off x="2404533" y="2635362"/>
+        <a:ext cx="2404533" cy="337790"/>
+      </dsp:txXfrm>
+    </dsp:sp>
+    <dsp:sp modelId="{5D0FAAC0-E80C-6F4C-B991-461536F28030}">
+      <dsp:nvSpPr>
+        <dsp:cNvPr id="0" name=""/>
+        <dsp:cNvSpPr/>
+      </dsp:nvSpPr>
+      <dsp:spPr>
+        <a:xfrm>
+          <a:off x="4809066" y="2635362"/>
+          <a:ext cx="2404533" cy="337790"/>
+        </a:xfrm>
+        <a:prstGeom prst="rect">
+          <a:avLst/>
+        </a:prstGeom>
+        <a:solidFill>
+          <a:schemeClr val="accent2">
+            <a:tint val="40000"/>
+            <a:alpha val="90000"/>
+            <a:hueOff val="-2727891"/>
+            <a:satOff val="30071"/>
+            <a:lumOff val="2864"/>
+            <a:alphaOff val="0"/>
+          </a:schemeClr>
+        </a:solidFill>
+        <a:ln w="19050" cap="rnd" cmpd="sng" algn="ctr">
+          <a:solidFill>
+            <a:schemeClr val="accent2">
+              <a:tint val="40000"/>
+              <a:alpha val="90000"/>
+              <a:hueOff val="-2727891"/>
+              <a:satOff val="30071"/>
+              <a:lumOff val="2864"/>
+              <a:alphaOff val="0"/>
+            </a:schemeClr>
+          </a:solidFill>
+          <a:prstDash val="solid"/>
+        </a:ln>
+        <a:effectLst/>
+      </dsp:spPr>
+      <dsp:style>
+        <a:lnRef idx="2">
+          <a:scrgbClr r="0" g="0" b="0"/>
+        </a:lnRef>
+        <a:fillRef idx="1">
+          <a:scrgbClr r="0" g="0" b="0"/>
+        </a:fillRef>
+        <a:effectRef idx="0">
+          <a:scrgbClr r="0" g="0" b="0"/>
+        </a:effectRef>
+        <a:fontRef idx="minor"/>
+      </dsp:style>
+      <dsp:txBody>
+        <a:bodyPr spcFirstLastPara="0" vert="horz" wrap="square" lIns="78232" tIns="13970" rIns="78232" bIns="13970" numCol="1" spcCol="1270" anchor="ctr" anchorCtr="0">
+          <a:noAutofit/>
+        </a:bodyPr>
+        <a:lstStyle/>
+        <a:p>
+          <a:pPr marL="0" lvl="0" indent="0" algn="ctr" defTabSz="488950">
+            <a:lnSpc>
+              <a:spcPct val="90000"/>
+            </a:lnSpc>
+            <a:spcBef>
+              <a:spcPct val="0"/>
+            </a:spcBef>
+            <a:spcAft>
+              <a:spcPct val="35000"/>
+            </a:spcAft>
+            <a:buNone/>
+          </a:pPr>
+          <a:r>
+            <a:rPr lang="en-US" sz="1100" kern="1200"/>
+            <a:t>Future classes</a:t>
+          </a:r>
+        </a:p>
+      </dsp:txBody>
+      <dsp:txXfrm>
+        <a:off x="4809066" y="2635362"/>
+        <a:ext cx="2404533" cy="337790"/>
+      </dsp:txXfrm>
+    </dsp:sp>
+    <dsp:sp modelId="{72F0CC84-945D-3F44-9A5E-B0831EAD2D33}">
+      <dsp:nvSpPr>
+        <dsp:cNvPr id="0" name=""/>
+        <dsp:cNvSpPr/>
+      </dsp:nvSpPr>
+      <dsp:spPr>
+        <a:xfrm>
+          <a:off x="7213599" y="2635362"/>
+          <a:ext cx="2404533" cy="337790"/>
+        </a:xfrm>
+        <a:prstGeom prst="rect">
+          <a:avLst/>
+        </a:prstGeom>
+        <a:solidFill>
+          <a:schemeClr val="accent2">
+            <a:tint val="40000"/>
+            <a:alpha val="90000"/>
+            <a:hueOff val="-4091836"/>
+            <a:satOff val="45107"/>
+            <a:lumOff val="4296"/>
+            <a:alphaOff val="0"/>
+          </a:schemeClr>
+        </a:solidFill>
+        <a:ln w="19050" cap="rnd" cmpd="sng" algn="ctr">
+          <a:solidFill>
+            <a:schemeClr val="accent2">
+              <a:tint val="40000"/>
+              <a:alpha val="90000"/>
+              <a:hueOff val="-4091836"/>
+              <a:satOff val="45107"/>
+              <a:lumOff val="4296"/>
+              <a:alphaOff val="0"/>
+            </a:schemeClr>
+          </a:solidFill>
+          <a:prstDash val="solid"/>
+        </a:ln>
+        <a:effectLst/>
+      </dsp:spPr>
+      <dsp:style>
+        <a:lnRef idx="2">
+          <a:scrgbClr r="0" g="0" b="0"/>
+        </a:lnRef>
+        <a:fillRef idx="1">
+          <a:scrgbClr r="0" g="0" b="0"/>
+        </a:fillRef>
+        <a:effectRef idx="0">
+          <a:scrgbClr r="0" g="0" b="0"/>
+        </a:effectRef>
+        <a:fontRef idx="minor"/>
+      </dsp:style>
+      <dsp:txBody>
+        <a:bodyPr spcFirstLastPara="0" vert="horz" wrap="square" lIns="78232" tIns="13970" rIns="78232" bIns="13970" numCol="1" spcCol="1270" anchor="ctr" anchorCtr="0">
+          <a:noAutofit/>
+        </a:bodyPr>
+        <a:lstStyle/>
+        <a:p>
+          <a:pPr marL="0" lvl="0" indent="0" algn="ctr" defTabSz="488950">
+            <a:lnSpc>
+              <a:spcPct val="90000"/>
+            </a:lnSpc>
+            <a:spcBef>
+              <a:spcPct val="0"/>
+            </a:spcBef>
+            <a:spcAft>
+              <a:spcPct val="35000"/>
+            </a:spcAft>
+            <a:buNone/>
+          </a:pPr>
+          <a:r>
+            <a:rPr lang="en-US" sz="1100" kern="1200"/>
+            <a:t>People anywhere/anywhen in the world</a:t>
+          </a:r>
+        </a:p>
+      </dsp:txBody>
+      <dsp:txXfrm>
+        <a:off x="7213599" y="2635362"/>
+        <a:ext cx="2404533" cy="337790"/>
+      </dsp:txXfrm>
+    </dsp:sp>
+    <dsp:sp modelId="{4A6189C4-F783-F448-8EE2-C624E136F3EF}">
+      <dsp:nvSpPr>
+        <dsp:cNvPr id="0" name=""/>
+        <dsp:cNvSpPr/>
+      </dsp:nvSpPr>
+      <dsp:spPr>
+        <a:xfrm rot="10800000">
+          <a:off x="0" y="1120108"/>
+          <a:ext cx="9618133" cy="1129735"/>
+        </a:xfrm>
+        <a:prstGeom prst="upArrowCallout">
+          <a:avLst/>
+        </a:prstGeom>
+        <a:solidFill>
+          <a:schemeClr val="accent2">
+            <a:hueOff val="-1976191"/>
+            <a:satOff val="9467"/>
+            <a:lumOff val="8758"/>
+            <a:alphaOff val="0"/>
+          </a:schemeClr>
+        </a:solidFill>
+        <a:ln w="19050" cap="rnd" cmpd="sng" algn="ctr">
+          <a:solidFill>
+            <a:schemeClr val="lt1">
+              <a:hueOff val="0"/>
+              <a:satOff val="0"/>
+              <a:lumOff val="0"/>
+              <a:alphaOff val="0"/>
+            </a:schemeClr>
+          </a:solidFill>
+          <a:prstDash val="solid"/>
+        </a:ln>
+        <a:effectLst/>
+      </dsp:spPr>
+      <dsp:style>
+        <a:lnRef idx="2">
+          <a:scrgbClr r="0" g="0" b="0"/>
+        </a:lnRef>
+        <a:fillRef idx="1">
+          <a:scrgbClr r="0" g="0" b="0"/>
+        </a:fillRef>
+        <a:effectRef idx="0">
+          <a:scrgbClr r="0" g="0" b="0"/>
+        </a:effectRef>
+        <a:fontRef idx="minor">
+          <a:schemeClr val="lt1"/>
+        </a:fontRef>
+      </dsp:style>
+      <dsp:txBody>
+        <a:bodyPr spcFirstLastPara="0" vert="horz" wrap="square" lIns="99568" tIns="99568" rIns="99568" bIns="99568" numCol="1" spcCol="1270" anchor="ctr" anchorCtr="0">
+          <a:noAutofit/>
+        </a:bodyPr>
+        <a:lstStyle/>
+        <a:p>
+          <a:pPr marL="0" lvl="0" indent="0" algn="ctr" defTabSz="622300">
+            <a:lnSpc>
+              <a:spcPct val="90000"/>
+            </a:lnSpc>
+            <a:spcBef>
+              <a:spcPct val="0"/>
+            </a:spcBef>
+            <a:spcAft>
+              <a:spcPct val="35000"/>
+            </a:spcAft>
+            <a:buNone/>
+          </a:pPr>
+          <a:r>
+            <a:rPr lang="en-US" sz="1400" kern="1200"/>
+            <a:t>Reinforces “open science and engineering” concepts</a:t>
+          </a:r>
+        </a:p>
+      </dsp:txBody>
+      <dsp:txXfrm rot="10800000">
+        <a:off x="0" y="1120108"/>
+        <a:ext cx="9618133" cy="734068"/>
+      </dsp:txXfrm>
+    </dsp:sp>
+    <dsp:sp modelId="{7ABA7142-BFD6-DD46-A5B2-AB2C97ADAB8D}">
+      <dsp:nvSpPr>
+        <dsp:cNvPr id="0" name=""/>
+        <dsp:cNvSpPr/>
+      </dsp:nvSpPr>
+      <dsp:spPr>
+        <a:xfrm rot="10800000">
+          <a:off x="0" y="1391"/>
+          <a:ext cx="9618133" cy="1129735"/>
+        </a:xfrm>
+        <a:prstGeom prst="upArrowCallout">
+          <a:avLst/>
+        </a:prstGeom>
+        <a:solidFill>
+          <a:schemeClr val="accent2">
+            <a:hueOff val="-2964286"/>
+            <a:satOff val="14200"/>
+            <a:lumOff val="13137"/>
+            <a:alphaOff val="0"/>
+          </a:schemeClr>
+        </a:solidFill>
+        <a:ln w="19050" cap="rnd" cmpd="sng" algn="ctr">
+          <a:solidFill>
+            <a:schemeClr val="lt1">
+              <a:hueOff val="0"/>
+              <a:satOff val="0"/>
+              <a:lumOff val="0"/>
+              <a:alphaOff val="0"/>
+            </a:schemeClr>
+          </a:solidFill>
+          <a:prstDash val="solid"/>
+        </a:ln>
+        <a:effectLst/>
+      </dsp:spPr>
+      <dsp:style>
+        <a:lnRef idx="2">
+          <a:scrgbClr r="0" g="0" b="0"/>
+        </a:lnRef>
+        <a:fillRef idx="1">
+          <a:scrgbClr r="0" g="0" b="0"/>
+        </a:fillRef>
+        <a:effectRef idx="0">
+          <a:scrgbClr r="0" g="0" b="0"/>
+        </a:effectRef>
+        <a:fontRef idx="minor">
+          <a:schemeClr val="lt1"/>
+        </a:fontRef>
+      </dsp:style>
+      <dsp:txBody>
+        <a:bodyPr spcFirstLastPara="0" vert="horz" wrap="square" lIns="99568" tIns="99568" rIns="99568" bIns="99568" numCol="1" spcCol="1270" anchor="ctr" anchorCtr="0">
+          <a:noAutofit/>
+        </a:bodyPr>
+        <a:lstStyle/>
+        <a:p>
+          <a:pPr marL="0" lvl="0" indent="0" algn="ctr" defTabSz="622300">
+            <a:lnSpc>
+              <a:spcPct val="90000"/>
+            </a:lnSpc>
+            <a:spcBef>
+              <a:spcPct val="0"/>
+            </a:spcBef>
+            <a:spcAft>
+              <a:spcPct val="35000"/>
+            </a:spcAft>
+            <a:buNone/>
+          </a:pPr>
+          <a:r>
+            <a:rPr lang="en-US" sz="1400" kern="1200"/>
+            <a:t>Introduced briefly in OCN 350; to be used extensively in OCN 479</a:t>
+          </a:r>
+        </a:p>
+      </dsp:txBody>
+      <dsp:txXfrm rot="10800000">
+        <a:off x="0" y="1391"/>
+        <a:ext cx="9618133" cy="734068"/>
+      </dsp:txXfrm>
+    </dsp:sp>
+  </dsp:spTree>
+</dsp:drawing>
+</file>
+
+<file path=ppt/diagrams/layout1.xml><?xml version="1.0" encoding="utf-8"?>
+<dgm:layoutDef xmlns:dgm="http://schemas.openxmlformats.org/drawingml/2006/diagram" xmlns:a="http://schemas.openxmlformats.org/drawingml/2006/main" uniqueId="urn:microsoft.com/office/officeart/2005/8/layout/process4">
+  <dgm:title val=""/>
+  <dgm:desc val=""/>
+  <dgm:catLst>
+    <dgm:cat type="process" pri="16000"/>
+    <dgm:cat type="list" pri="20000"/>
+  </dgm:catLst>
+  <dgm:sampData>
+    <dgm:dataModel>
+      <dgm:ptLst>
+        <dgm:pt modelId="0" type="doc"/>
+        <dgm:pt modelId="1">
+          <dgm:prSet phldr="1"/>
+        </dgm:pt>
+        <dgm:pt modelId="11">
+          <dgm:prSet phldr="1"/>
+        </dgm:pt>
+        <dgm:pt modelId="12">
+          <dgm:prSet phldr="1"/>
+        </dgm:pt>
+        <dgm:pt modelId="2">
+          <dgm:prSet phldr="1"/>
+        </dgm:pt>
+        <dgm:pt modelId="21">
+          <dgm:prSet phldr="1"/>
+        </dgm:pt>
+        <dgm:pt modelId="22">
+          <dgm:prSet phldr="1"/>
+        </dgm:pt>
+        <dgm:pt modelId="3">
+          <dgm:prSet phldr="1"/>
+        </dgm:pt>
+        <dgm:pt modelId="31">
+          <dgm:prSet phldr="1"/>
+        </dgm:pt>
+        <dgm:pt modelId="32">
+          <dgm:prSet phldr="1"/>
+        </dgm:pt>
+      </dgm:ptLst>
+      <dgm:cxnLst>
+        <dgm:cxn modelId="4" srcId="0" destId="1" srcOrd="0" destOrd="0"/>
+        <dgm:cxn modelId="5" srcId="0" destId="2" srcOrd="1" destOrd="0"/>
+        <dgm:cxn modelId="6" srcId="0" destId="3" srcOrd="2" destOrd="0"/>
+        <dgm:cxn modelId="13" srcId="1" destId="11" srcOrd="0" destOrd="0"/>
+        <dgm:cxn modelId="14" srcId="1" destId="12" srcOrd="1" destOrd="0"/>
+        <dgm:cxn modelId="23" srcId="2" destId="21" srcOrd="0" destOrd="0"/>
+        <dgm:cxn modelId="24" srcId="2" destId="22" srcOrd="1" destOrd="0"/>
+        <dgm:cxn modelId="33" srcId="3" destId="31" srcOrd="0" destOrd="0"/>
+        <dgm:cxn modelId="34" srcId="3" destId="32" srcOrd="1" destOrd="0"/>
+      </dgm:cxnLst>
+      <dgm:bg/>
+      <dgm:whole/>
+    </dgm:dataModel>
+  </dgm:sampData>
+  <dgm:styleData>
+    <dgm:dataModel>
+      <dgm:ptLst>
+        <dgm:pt modelId="0" type="doc"/>
+        <dgm:pt modelId="1"/>
+        <dgm:pt modelId="11"/>
+        <dgm:pt modelId="2"/>
+        <dgm:pt modelId="21"/>
+      </dgm:ptLst>
+      <dgm:cxnLst>
+        <dgm:cxn modelId="4" srcId="0" destId="1" srcOrd="0" destOrd="0"/>
+        <dgm:cxn modelId="5" srcId="0" destId="2" srcOrd="1" destOrd="0"/>
+        <dgm:cxn modelId="13" srcId="1" destId="11" srcOrd="0" destOrd="0"/>
+        <dgm:cxn modelId="23" srcId="2" destId="21" srcOrd="0" destOrd="0"/>
+      </dgm:cxnLst>
+      <dgm:bg/>
+      <dgm:whole/>
+    </dgm:dataModel>
+  </dgm:styleData>
+  <dgm:clrData>
+    <dgm:dataModel>
+      <dgm:ptLst>
+        <dgm:pt modelId="0" type="doc"/>
+        <dgm:pt modelId="1"/>
+        <dgm:pt modelId="11"/>
+        <dgm:pt modelId="2"/>
+        <dgm:pt modelId="21"/>
+        <dgm:pt modelId="3"/>
+        <dgm:pt modelId="31"/>
+        <dgm:pt modelId="4"/>
+        <dgm:pt modelId="41"/>
+      </dgm:ptLst>
+      <dgm:cxnLst>
+        <dgm:cxn modelId="5" srcId="0" destId="1" srcOrd="0" destOrd="0"/>
+        <dgm:cxn modelId="6" srcId="0" destId="2" srcOrd="1" destOrd="0"/>
+        <dgm:cxn modelId="7" srcId="0" destId="3" srcOrd="2" destOrd="0"/>
+        <dgm:cxn modelId="8" srcId="0" destId="4" srcOrd="3" destOrd="0"/>
+        <dgm:cxn modelId="13" srcId="1" destId="11" srcOrd="0" destOrd="0"/>
+        <dgm:cxn modelId="23" srcId="2" destId="21" srcOrd="0" destOrd="0"/>
+        <dgm:cxn modelId="33" srcId="3" destId="31" srcOrd="0" destOrd="0"/>
+        <dgm:cxn modelId="43" srcId="4" destId="41" srcOrd="0" destOrd="0"/>
+      </dgm:cxnLst>
+      <dgm:bg/>
+      <dgm:whole/>
+    </dgm:dataModel>
+  </dgm:clrData>
+  <dgm:layoutNode name="Name0">
+    <dgm:varLst>
+      <dgm:dir/>
+      <dgm:animLvl val="lvl"/>
+      <dgm:resizeHandles val="exact"/>
+    </dgm:varLst>
+    <dgm:alg type="lin">
+      <dgm:param type="linDir" val="fromB"/>
+    </dgm:alg>
+    <dgm:shape xmlns:r="http://schemas.openxmlformats.org/officeDocument/2006/relationships" r:blip="">
+      <dgm:adjLst/>
+    </dgm:shape>
+    <dgm:presOf/>
+    <dgm:constrLst>
+      <dgm:constr type="h" for="ch" forName="boxAndChildren" refType="h"/>
+      <dgm:constr type="h" for="ch" forName="arrowAndChildren" refType="h" refFor="ch" refForName="boxAndChildren" op="equ" fact="1.538"/>
+      <dgm:constr type="w" for="ch" forName="arrowAndChildren" refType="w"/>
+      <dgm:constr type="w" for="ch" forName="boxAndChildren" refType="w"/>
+      <dgm:constr type="h" for="ch" forName="sp" refType="h" fact="-0.015"/>
+      <dgm:constr type="primFontSz" for="des" forName="parentTextBox" val="65"/>
+      <dgm:constr type="primFontSz" for="des" forName="parentTextArrow" refType="primFontSz" refFor="des" refForName="parentTextBox" op="equ"/>
+      <dgm:constr type="primFontSz" for="des" forName="childTextArrow" val="65"/>
+      <dgm:constr type="primFontSz" for="des" forName="childTextBox" refType="primFontSz" refFor="des" refForName="childTextArrow" op="equ"/>
+    </dgm:constrLst>
+    <dgm:ruleLst/>
+    <dgm:forEach name="Name1" axis="ch" ptType="node" st="-1" step="-1">
+      <dgm:choose name="Name2">
+        <dgm:if name="Name3" axis="self" ptType="node" func="revPos" op="equ" val="1">
+          <dgm:layoutNode name="boxAndChildren">
+            <dgm:alg type="composite"/>
+            <dgm:shape xmlns:r="http://schemas.openxmlformats.org/officeDocument/2006/relationships" r:blip="">
+              <dgm:adjLst/>
+            </dgm:shape>
+            <dgm:presOf/>
+            <dgm:choose name="Name4">
+              <dgm:if name="Name5" axis="ch" ptType="node" func="cnt" op="gte" val="1">
+                <dgm:constrLst>
+                  <dgm:constr type="w" for="ch" forName="parentTextBox" refType="w"/>
+                  <dgm:constr type="h" for="ch" forName="parentTextBox" refType="h" fact="0.54"/>
+                  <dgm:constr type="t" for="ch" forName="parentTextBox"/>
+                  <dgm:constr type="w" for="ch" forName="entireBox" refType="w"/>
+                  <dgm:constr type="h" for="ch" forName="entireBox" refType="h"/>
+                  <dgm:constr type="w" for="ch" forName="descendantBox" refType="w"/>
+                  <dgm:constr type="b" for="ch" forName="descendantBox" refType="h" fact="0.98"/>
+                  <dgm:constr type="h" for="ch" forName="descendantBox" refType="h" fact="0.46"/>
+                </dgm:constrLst>
+              </dgm:if>
+              <dgm:else name="Name6">
+                <dgm:constrLst>
+                  <dgm:constr type="w" for="ch" forName="parentTextBox" refType="w"/>
+                  <dgm:constr type="h" for="ch" forName="parentTextBox" refType="h"/>
+                </dgm:constrLst>
+              </dgm:else>
+            </dgm:choose>
+            <dgm:ruleLst/>
+            <dgm:layoutNode name="parentTextBox">
+              <dgm:alg type="tx"/>
+              <dgm:choose name="Name7">
+                <dgm:if name="Name8" axis="ch" ptType="node" func="cnt" op="gte" val="1">
+                  <dgm:shape xmlns:r="http://schemas.openxmlformats.org/officeDocument/2006/relationships" type="rect" r:blip="" zOrderOff="1" hideGeom="1">
+                    <dgm:adjLst/>
+                  </dgm:shape>
+                </dgm:if>
+                <dgm:else name="Name9">
+                  <dgm:shape xmlns:r="http://schemas.openxmlformats.org/officeDocument/2006/relationships" type="rect" r:blip="">
+                    <dgm:adjLst/>
+                  </dgm:shape>
+                </dgm:else>
+              </dgm:choose>
+              <dgm:presOf axis="self"/>
+              <dgm:constrLst/>
+              <dgm:ruleLst>
+                <dgm:rule type="primFontSz" val="5" fact="NaN" max="NaN"/>
+              </dgm:ruleLst>
+            </dgm:layoutNode>
+            <dgm:choose name="Name10">
+              <dgm:if name="Name11" axis="ch" ptType="node" func="cnt" op="gte" val="1">
+                <dgm:layoutNode name="entireBox">
+                  <dgm:alg type="sp"/>
+                  <dgm:shape xmlns:r="http://schemas.openxmlformats.org/officeDocument/2006/relationships" type="rect" r:blip="">
+                    <dgm:adjLst/>
+                  </dgm:shape>
+                  <dgm:presOf axis="self"/>
+                  <dgm:constrLst/>
+                  <dgm:ruleLst/>
+                </dgm:layoutNode>
+                <dgm:layoutNode name="descendantBox" styleLbl="fgAccFollowNode1">
+                  <dgm:choose name="Name12">
+                    <dgm:if name="Name13" func="var" arg="dir" op="equ" val="norm">
+                      <dgm:alg type="lin"/>
+                    </dgm:if>
+                    <dgm:else name="Name14">
+                      <dgm:alg type="lin">
+                        <dgm:param type="linDir" val="fromR"/>
+                      </dgm:alg>
+                    </dgm:else>
+                  </dgm:choose>
+                  <dgm:shape xmlns:r="http://schemas.openxmlformats.org/officeDocument/2006/relationships" r:blip="">
+                    <dgm:adjLst/>
+                  </dgm:shape>
+                  <dgm:presOf/>
+                  <dgm:constrLst>
+                    <dgm:constr type="w" for="ch" forName="childTextBox" refType="w"/>
+                    <dgm:constr type="h" for="ch" forName="childTextBox" refType="h"/>
+                  </dgm:constrLst>
+                  <dgm:ruleLst/>
+                  <dgm:forEach name="Name15" axis="ch" ptType="node">
+                    <dgm:layoutNode name="childTextBox" styleLbl="fgAccFollowNode1">
+                      <dgm:varLst>
+                        <dgm:bulletEnabled val="1"/>
+                      </dgm:varLst>
+                      <dgm:alg type="tx"/>
+                      <dgm:shape xmlns:r="http://schemas.openxmlformats.org/officeDocument/2006/relationships" type="rect" r:blip="">
+                        <dgm:adjLst/>
+                      </dgm:shape>
+                      <dgm:presOf axis="desOrSelf" ptType="node"/>
+                      <dgm:constrLst>
+                        <dgm:constr type="tMarg" refType="primFontSz" fact="0.1"/>
+                        <dgm:constr type="bMarg" refType="primFontSz" fact="0.1"/>
+                      </dgm:constrLst>
+                      <dgm:ruleLst>
+                        <dgm:rule type="primFontSz" val="5" fact="NaN" max="NaN"/>
+                      </dgm:ruleLst>
+                    </dgm:layoutNode>
+                  </dgm:forEach>
+                </dgm:layoutNode>
+              </dgm:if>
+              <dgm:else name="Name16"/>
+            </dgm:choose>
+          </dgm:layoutNode>
+        </dgm:if>
+        <dgm:else name="Name17">
+          <dgm:layoutNode name="arrowAndChildren">
+            <dgm:alg type="composite"/>
+            <dgm:shape xmlns:r="http://schemas.openxmlformats.org/officeDocument/2006/relationships" r:blip="">
+              <dgm:adjLst/>
+            </dgm:shape>
+            <dgm:presOf/>
+            <dgm:choose name="Name18">
+              <dgm:if name="Name19" axis="ch" ptType="node" func="cnt" op="gte" val="1">
+                <dgm:constrLst>
+                  <dgm:constr type="w" for="ch" forName="parentTextArrow" refType="w"/>
+                  <dgm:constr type="t" for="ch" forName="parentTextArrow"/>
+                  <dgm:constr type="h" for="ch" forName="parentTextArrow" refType="h" fact="0.351"/>
+                  <dgm:constr type="w" for="ch" forName="arrow" refType="w"/>
+                  <dgm:constr type="h" for="ch" forName="arrow" refType="h"/>
+                  <dgm:constr type="w" for="ch" forName="descendantArrow" refType="w"/>
+                  <dgm:constr type="b" for="ch" forName="descendantArrow" refType="h" fact="0.65"/>
+                  <dgm:constr type="h" for="ch" forName="descendantArrow" refType="h" fact="0.299"/>
+                </dgm:constrLst>
+              </dgm:if>
+              <dgm:else name="Name20">
+                <dgm:constrLst>
+                  <dgm:constr type="w" for="ch" forName="parentTextArrow" refType="w"/>
+                  <dgm:constr type="h" for="ch" forName="parentTextArrow" refType="h"/>
+                </dgm:constrLst>
+              </dgm:else>
+            </dgm:choose>
+            <dgm:ruleLst/>
+            <dgm:layoutNode name="parentTextArrow">
+              <dgm:alg type="tx"/>
+              <dgm:choose name="Name21">
+                <dgm:if name="Name22" axis="ch" ptType="node" func="cnt" op="gte" val="1">
+                  <dgm:shape xmlns:r="http://schemas.openxmlformats.org/officeDocument/2006/relationships" type="rect" r:blip="" zOrderOff="1" hideGeom="1">
+                    <dgm:adjLst/>
+                  </dgm:shape>
+                </dgm:if>
+                <dgm:else name="Name23">
+                  <dgm:shape xmlns:r="http://schemas.openxmlformats.org/officeDocument/2006/relationships" rot="180" type="upArrowCallout" r:blip="">
+                    <dgm:adjLst/>
+                  </dgm:shape>
+                </dgm:else>
+              </dgm:choose>
+              <dgm:presOf axis="self"/>
+              <dgm:constrLst/>
+              <dgm:ruleLst>
+                <dgm:rule type="primFontSz" val="5" fact="NaN" max="NaN"/>
+              </dgm:ruleLst>
+            </dgm:layoutNode>
+            <dgm:choose name="Name24">
+              <dgm:if name="Name25" axis="ch" ptType="node" func="cnt" op="gte" val="1">
+                <dgm:layoutNode name="arrow">
+                  <dgm:alg type="sp"/>
+                  <dgm:shape xmlns:r="http://schemas.openxmlformats.org/officeDocument/2006/relationships" rot="180" type="upArrowCallout" r:blip="">
+                    <dgm:adjLst/>
+                  </dgm:shape>
+                  <dgm:presOf axis="self"/>
+                  <dgm:constrLst/>
+                  <dgm:ruleLst/>
+                </dgm:layoutNode>
+                <dgm:layoutNode name="descendantArrow">
+                  <dgm:choose name="Name26">
+                    <dgm:if name="Name27" func="var" arg="dir" op="equ" val="norm">
+                      <dgm:alg type="lin"/>
+                    </dgm:if>
+                    <dgm:else name="Name28">
+                      <dgm:alg type="lin">
+                        <dgm:param type="linDir" val="fromR"/>
+                      </dgm:alg>
+                    </dgm:else>
+                  </dgm:choose>
+                  <dgm:shape xmlns:r="http://schemas.openxmlformats.org/officeDocument/2006/relationships" r:blip="">
+                    <dgm:adjLst/>
+                  </dgm:shape>
+                  <dgm:presOf/>
+                  <dgm:constrLst>
+                    <dgm:constr type="w" for="ch" forName="childTextArrow" refType="w"/>
+                    <dgm:constr type="h" for="ch" forName="childTextArrow" refType="h"/>
+                  </dgm:constrLst>
+                  <dgm:ruleLst/>
+                  <dgm:forEach name="Name29" axis="ch" ptType="node">
+                    <dgm:layoutNode name="childTextArrow" styleLbl="fgAccFollowNode1">
+                      <dgm:varLst>
+                        <dgm:bulletEnabled val="1"/>
+                      </dgm:varLst>
+                      <dgm:alg type="tx"/>
+                      <dgm:shape xmlns:r="http://schemas.openxmlformats.org/officeDocument/2006/relationships" type="rect" r:blip="">
+                        <dgm:adjLst/>
+                      </dgm:shape>
+                      <dgm:presOf axis="desOrSelf" ptType="node"/>
+                      <dgm:constrLst>
+                        <dgm:constr type="tMarg" refType="primFontSz" fact="0.1"/>
+                        <dgm:constr type="bMarg" refType="primFontSz" fact="0.1"/>
+                      </dgm:constrLst>
+                      <dgm:ruleLst>
+                        <dgm:rule type="primFontSz" val="5" fact="NaN" max="NaN"/>
+                      </dgm:ruleLst>
+                    </dgm:layoutNode>
+                  </dgm:forEach>
+                </dgm:layoutNode>
+              </dgm:if>
+              <dgm:else name="Name30"/>
+            </dgm:choose>
+          </dgm:layoutNode>
+        </dgm:else>
+      </dgm:choose>
+      <dgm:forEach name="Name31" axis="precedSib" ptType="sibTrans" st="-1" cnt="1">
+        <dgm:layoutNode name="sp">
+          <dgm:alg type="sp"/>
+          <dgm:shape xmlns:r="http://schemas.openxmlformats.org/officeDocument/2006/relationships" r:blip="">
+            <dgm:adjLst/>
+          </dgm:shape>
+          <dgm:presOf axis="self"/>
+          <dgm:constrLst/>
+          <dgm:ruleLst/>
+        </dgm:layoutNode>
+      </dgm:forEach>
+    </dgm:forEach>
+  </dgm:layoutNode>
+</dgm:layoutDef>
+</file>
+
+<file path=ppt/diagrams/quickStyle1.xml><?xml version="1.0" encoding="utf-8"?>
+<dgm:styleDef xmlns:dgm="http://schemas.openxmlformats.org/drawingml/2006/diagram" xmlns:a="http://schemas.openxmlformats.org/drawingml/2006/main" uniqueId="urn:microsoft.com/office/officeart/2005/8/quickstyle/simple1">
+  <dgm:title val=""/>
+  <dgm:desc val=""/>
+  <dgm:catLst>
+    <dgm:cat type="simple" pri="10100"/>
+  </dgm:catLst>
+  <dgm:scene3d>
+    <a:camera prst="orthographicFront"/>
+    <a:lightRig rig="threePt" dir="t"/>
+  </dgm:scene3d>
+  <dgm:styleLbl name="node0">
+    <dgm:scene3d>
+      <a:camera prst="orthographicFront"/>
+      <a:lightRig rig="threePt" dir="t"/>
+    </dgm:scene3d>
+    <dgm:sp3d/>
+    <dgm:txPr/>
+    <dgm:style>
+      <a:lnRef idx="2">
+        <a:scrgbClr r="0" g="0" b="0"/>
+      </a:lnRef>
+      <a:fillRef idx="1">
+        <a:scrgbClr r="0" g="0" b="0"/>
+      </a:fillRef>
+      <a:effectRef idx="0">
+        <a:scrgbClr r="0" g="0" b="0"/>
+      </a:effectRef>
+      <a:fontRef idx="minor">
+        <a:schemeClr val="lt1"/>
+      </a:fontRef>
+    </dgm:style>
+  </dgm:styleLbl>
+  <dgm:styleLbl name="lnNode1">
+    <dgm:scene3d>
+      <a:camera prst="orthographicFront"/>
+      <a:lightRig rig="threePt" dir="t"/>
+    </dgm:scene3d>
+    <dgm:sp3d/>
+    <dgm:txPr/>
+    <dgm:style>
+      <a:lnRef idx="2">
+        <a:scrgbClr r="0" g="0" b="0"/>
+      </a:lnRef>
+      <a:fillRef idx="1">
+        <a:scrgbClr r="0" g="0" b="0"/>
+      </a:fillRef>
+      <a:effectRef idx="0">
+        <a:scrgbClr r="0" g="0" b="0"/>
+      </a:effectRef>
+      <a:fontRef idx="minor">
+        <a:schemeClr val="lt1"/>
+      </a:fontRef>
+    </dgm:style>
+  </dgm:styleLbl>
+  <dgm:styleLbl name="vennNode1">
+    <dgm:scene3d>
+      <a:camera prst="orthographicFront"/>
+      <a:lightRig rig="threePt" dir="t"/>
+    </dgm:scene3d>
+    <dgm:sp3d/>
+    <dgm:txPr/>
+    <dgm:style>
+      <a:lnRef idx="2">
+        <a:scrgbClr r="0" g="0" b="0"/>
+      </a:lnRef>
+      <a:fillRef idx="1">
+        <a:scrgbClr r="0" g="0" b="0"/>
+      </a:fillRef>
+      <a:effectRef idx="0">
+        <a:scrgbClr r="0" g="0" b="0"/>
+      </a:effectRef>
+      <a:fontRef idx="minor">
+        <a:schemeClr val="tx1"/>
+      </a:fontRef>
+    </dgm:style>
+  </dgm:styleLbl>
+  <dgm:styleLbl name="alignNode1">
+    <dgm:scene3d>
+      <a:camera prst="orthographicFront"/>
+      <a:lightRig rig="threePt" dir="t"/>
+    </dgm:scene3d>
+    <dgm:sp3d/>
+    <dgm:txPr/>
+    <dgm:style>
+      <a:lnRef idx="2">
+        <a:scrgbClr r="0" g="0" b="0"/>
+      </a:lnRef>
+      <a:fillRef idx="1">
+        <a:scrgbClr r="0" g="0" b="0"/>
+      </a:fillRef>
+      <a:effectRef idx="0">
+        <a:scrgbClr r="0" g="0" b="0"/>
+      </a:effectRef>
+      <a:fontRef idx="minor">
+        <a:schemeClr val="lt1"/>
+      </a:fontRef>
+    </dgm:style>
+  </dgm:styleLbl>
+  <dgm:styleLbl name="node1">
+    <dgm:scene3d>
+      <a:camera prst="orthographicFront"/>
+      <a:lightRig rig="threePt" dir="t"/>
+    </dgm:scene3d>
+    <dgm:sp3d/>
+    <dgm:txPr/>
+    <dgm:style>
+      <a:lnRef idx="2">
+        <a:scrgbClr r="0" g="0" b="0"/>
+      </a:lnRef>
+      <a:fillRef idx="1">
+        <a:scrgbClr r="0" g="0" b="0"/>
+      </a:fillRef>
+      <a:effectRef idx="0">
+        <a:scrgbClr r="0" g="0" b="0"/>
+      </a:effectRef>
+      <a:fontRef idx="minor">
+        <a:schemeClr val="lt1"/>
+      </a:fontRef>
+    </dgm:style>
+  </dgm:styleLbl>
+  <dgm:styleLbl name="node2">
+    <dgm:scene3d>
+      <a:camera prst="orthographicFront"/>
+      <a:lightRig rig="threePt" dir="t"/>
+    </dgm:scene3d>
+    <dgm:sp3d/>
+    <dgm:txPr/>
+    <dgm:style>
+      <a:lnRef idx="2">
+        <a:scrgbClr r="0" g="0" b="0"/>
+      </a:lnRef>
+      <a:fillRef idx="1">
+        <a:scrgbClr r="0" g="0" b="0"/>
+      </a:fillRef>
+      <a:effectRef idx="0">
+        <a:scrgbClr r="0" g="0" b="0"/>
+      </a:effectRef>
+      <a:fontRef idx="minor">
+        <a:schemeClr val="lt1"/>
+      </a:fontRef>
+    </dgm:style>
+  </dgm:styleLbl>
+  <dgm:styleLbl name="node3">
+    <dgm:scene3d>
+      <a:camera prst="orthographicFront"/>
+      <a:lightRig rig="threePt" dir="t"/>
+    </dgm:scene3d>
+    <dgm:sp3d/>
+    <dgm:txPr/>
+    <dgm:style>
+      <a:lnRef idx="2">
+        <a:scrgbClr r="0" g="0" b="0"/>
+      </a:lnRef>
+      <a:fillRef idx="1">
+        <a:scrgbClr r="0" g="0" b="0"/>
+      </a:fillRef>
+      <a:effectRef idx="0">
+        <a:scrgbClr r="0" g="0" b="0"/>
+      </a:effectRef>
+      <a:fontRef idx="minor">
+        <a:schemeClr val="lt1"/>
+      </a:fontRef>
+    </dgm:style>
+  </dgm:styleLbl>
+  <dgm:styleLbl name="node4">
+    <dgm:scene3d>
+      <a:camera prst="orthographicFront"/>
+      <a:lightRig rig="threePt" dir="t"/>
+    </dgm:scene3d>
+    <dgm:sp3d/>
+    <dgm:txPr/>
+    <dgm:style>
+      <a:lnRef idx="2">
+        <a:scrgbClr r="0" g="0" b="0"/>
+      </a:lnRef>
+      <a:fillRef idx="1">
+        <a:scrgbClr r="0" g="0" b="0"/>
+      </a:fillRef>
+      <a:effectRef idx="0">
+        <a:scrgbClr r="0" g="0" b="0"/>
+      </a:effectRef>
+      <a:fontRef idx="minor">
+        <a:schemeClr val="lt1"/>
+      </a:fontRef>
+    </dgm:style>
+  </dgm:styleLbl>
+  <dgm:styleLbl name="fgImgPlace1">
+    <dgm:scene3d>
+      <a:camera prst="orthographicFront"/>
+      <a:lightRig rig="threePt" dir="t"/>
+    </dgm:scene3d>
+    <dgm:sp3d/>
+    <dgm:txPr/>
+    <dgm:style>
+      <a:lnRef idx="2">
+        <a:scrgbClr r="0" g="0" b="0"/>
+      </a:lnRef>
+      <a:fillRef idx="1">
+        <a:scrgbClr r="0" g="0" b="0"/>
+      </a:fillRef>
+      <a:effectRef idx="0">
+        <a:scrgbClr r="0" g="0" b="0"/>
+      </a:effectRef>
+      <a:fontRef idx="minor"/>
+    </dgm:style>
+  </dgm:styleLbl>
+  <dgm:styleLbl name="alignImgPlace1">
+    <dgm:scene3d>
+      <a:camera prst="orthographicFront"/>
+      <a:lightRig rig="threePt" dir="t"/>
+    </dgm:scene3d>
+    <dgm:sp3d/>
+    <dgm:txPr/>
+    <dgm:style>
+      <a:lnRef idx="2">
+        <a:scrgbClr r="0" g="0" b="0"/>
+      </a:lnRef>
+      <a:fillRef idx="1">
+        <a:scrgbClr r="0" g="0" b="0"/>
+      </a:fillRef>
+      <a:effectRef idx="0">
+        <a:scrgbClr r="0" g="0" b="0"/>
+      </a:effectRef>
+      <a:fontRef idx="minor"/>
+    </dgm:style>
+  </dgm:styleLbl>
+  <dgm:styleLbl name="bgImgPlace1">
+    <dgm:scene3d>
+      <a:camera prst="orthographicFront"/>
+      <a:lightRig rig="threePt" dir="t"/>
+    </dgm:scene3d>
+    <dgm:sp3d/>
+    <dgm:txPr/>
+    <dgm:style>
+      <a:lnRef idx="2">
+        <a:scrgbClr r="0" g="0" b="0"/>
+      </a:lnRef>
+      <a:fillRef idx="1">
+        <a:scrgbClr r="0" g="0" b="0"/>
+      </a:fillRef>
+      <a:effectRef idx="0">
+        <a:scrgbClr r="0" g="0" b="0"/>
+      </a:effectRef>
+      <a:fontRef idx="minor"/>
+    </dgm:style>
+  </dgm:styleLbl>
+  <dgm:styleLbl name="sibTrans2D1">
+    <dgm:scene3d>
+      <a:camera prst="orthographicFront"/>
+      <a:lightRig rig="threePt" dir="t"/>
+    </dgm:scene3d>
+    <dgm:sp3d/>
+    <dgm:txPr/>
+    <dgm:style>
+      <a:lnRef idx="0">
+        <a:scrgbClr r="0" g="0" b="0"/>
+      </a:lnRef>
+      <a:fillRef idx="1">
+        <a:scrgbClr r="0" g="0" b="0"/>
+      </a:fillRef>
+      <a:effectRef idx="0">
+        <a:scrgbClr r="0" g="0" b="0"/>
+      </a:effectRef>
+      <a:fontRef idx="minor">
+        <a:schemeClr val="lt1"/>
+      </a:fontRef>
+    </dgm:style>
+  </dgm:styleLbl>
+  <dgm:styleLbl name="fgSibTrans2D1">
+    <dgm:scene3d>
+      <a:camera prst="orthographicFront"/>
+      <a:lightRig rig="threePt" dir="t"/>
+    </dgm:scene3d>
+    <dgm:sp3d/>
+    <dgm:txPr/>
+    <dgm:style>
+      <a:lnRef idx="0">
+        <a:scrgbClr r="0" g="0" b="0"/>
+      </a:lnRef>
+      <a:fillRef idx="1">
+        <a:scrgbClr r="0" g="0" b="0"/>
+      </a:fillRef>
+      <a:effectRef idx="0">
+        <a:scrgbClr r="0" g="0" b="0"/>
+      </a:effectRef>
+      <a:fontRef idx="minor">
+        <a:schemeClr val="lt1"/>
+      </a:fontRef>
+    </dgm:style>
+  </dgm:styleLbl>
+  <dgm:styleLbl name="bgSibTrans2D1">
+    <dgm:scene3d>
+      <a:camera prst="orthographicFront"/>
+      <a:lightRig rig="threePt" dir="t"/>
+    </dgm:scene3d>
+    <dgm:sp3d/>
+    <dgm:txPr/>
+    <dgm:style>
+      <a:lnRef idx="0">
+        <a:scrgbClr r="0" g="0" b="0"/>
+      </a:lnRef>
+      <a:fillRef idx="1">
+        <a:scrgbClr r="0" g="0" b="0"/>
+      </a:fillRef>
+      <a:effectRef idx="0">
+        <a:scrgbClr r="0" g="0" b="0"/>
+      </a:effectRef>
+      <a:fontRef idx="minor">
+        <a:schemeClr val="lt1"/>
+      </a:fontRef>
+    </dgm:style>
+  </dgm:styleLbl>
+  <dgm:styleLbl name="sibTrans1D1">
+    <dgm:scene3d>
+      <a:camera prst="orthographicFront"/>
+      <a:lightRig rig="threePt" dir="t"/>
+    </dgm:scene3d>
+    <dgm:sp3d/>
+    <dgm:txPr/>
+    <dgm:style>
+      <a:lnRef idx="1">
+        <a:scrgbClr r="0" g="0" b="0"/>
+      </a:lnRef>
+      <a:fillRef idx="0">
+        <a:scrgbClr r="0" g="0" b="0"/>
+      </a:fillRef>
+      <a:effectRef idx="0">
+        <a:scrgbClr r="0" g="0" b="0"/>
+      </a:effectRef>
+      <a:fontRef idx="minor"/>
+    </dgm:style>
+  </dgm:styleLbl>
+  <dgm:styleLbl name="callout">
+    <dgm:scene3d>
+      <a:camera prst="orthographicFront"/>
+      <a:lightRig rig="threePt" dir="t"/>
+    </dgm:scene3d>
+    <dgm:sp3d/>
+    <dgm:txPr/>
+    <dgm:style>
+      <a:lnRef idx="2">
+        <a:scrgbClr r="0" g="0" b="0"/>
+      </a:lnRef>
+      <a:fillRef idx="1">
+        <a:scrgbClr r="0" g="0" b="0"/>
+      </a:fillRef>
+      <a:effectRef idx="0">
+        <a:scrgbClr r="0" g="0" b="0"/>
+      </a:effectRef>
+      <a:fontRef idx="minor"/>
+    </dgm:style>
+  </dgm:styleLbl>
+  <dgm:styleLbl name="asst0">
+    <dgm:scene3d>
+      <a:camera prst="orthographicFront"/>
+      <a:lightRig rig="threePt" dir="t"/>
+    </dgm:scene3d>
+    <dgm:sp3d/>
+    <dgm:txPr/>
+    <dgm:style>
+      <a:lnRef idx="2">
+        <a:scrgbClr r="0" g="0" b="0"/>
+      </a:lnRef>
+      <a:fillRef idx="1">
+        <a:scrgbClr r="0" g="0" b="0"/>
+      </a:fillRef>
+      <a:effectRef idx="0">
+        <a:scrgbClr r="0" g="0" b="0"/>
+      </a:effectRef>
+      <a:fontRef idx="minor">
+        <a:schemeClr val="lt1"/>
+      </a:fontRef>
+    </dgm:style>
+  </dgm:styleLbl>
+  <dgm:styleLbl name="asst1">
+    <dgm:scene3d>
+      <a:camera prst="orthographicFront"/>
+      <a:lightRig rig="threePt" dir="t"/>
+    </dgm:scene3d>
+    <dgm:sp3d/>
+    <dgm:txPr/>
+    <dgm:style>
+      <a:lnRef idx="2">
+        <a:scrgbClr r="0" g="0" b="0"/>
+      </a:lnRef>
+      <a:fillRef idx="1">
+        <a:scrgbClr r="0" g="0" b="0"/>
+      </a:fillRef>
+      <a:effectRef idx="0">
+        <a:scrgbClr r="0" g="0" b="0"/>
+      </a:effectRef>
+      <a:fontRef idx="minor">
+        <a:schemeClr val="lt1"/>
+      </a:fontRef>
+    </dgm:style>
+  </dgm:styleLbl>
+  <dgm:styleLbl name="asst2">
+    <dgm:scene3d>
+      <a:camera prst="orthographicFront"/>
+      <a:lightRig rig="threePt" dir="t"/>
+    </dgm:scene3d>
+    <dgm:sp3d/>
+    <dgm:txPr/>
+    <dgm:style>
+      <a:lnRef idx="2">
+        <a:scrgbClr r="0" g="0" b="0"/>
+      </a:lnRef>
+      <a:fillRef idx="1">
+        <a:scrgbClr r="0" g="0" b="0"/>
+      </a:fillRef>
+      <a:effectRef idx="0">
+        <a:scrgbClr r="0" g="0" b="0"/>
+      </a:effectRef>
+      <a:fontRef idx="minor">
+        <a:schemeClr val="lt1"/>
+      </a:fontRef>
+    </dgm:style>
+  </dgm:styleLbl>
+  <dgm:styleLbl name="asst3">
+    <dgm:scene3d>
+      <a:camera prst="orthographicFront"/>
+      <a:lightRig rig="threePt" dir="t"/>
+    </dgm:scene3d>
+    <dgm:sp3d/>
+    <dgm:txPr/>
+    <dgm:style>
+      <a:lnRef idx="2">
+        <a:scrgbClr r="0" g="0" b="0"/>
+      </a:lnRef>
+      <a:fillRef idx="1">
+        <a:scrgbClr r="0" g="0" b="0"/>
+      </a:fillRef>
+      <a:effectRef idx="0">
+        <a:scrgbClr r="0" g="0" b="0"/>
+      </a:effectRef>
+      <a:fontRef idx="minor">
+        <a:schemeClr val="lt1"/>
+      </a:fontRef>
+    </dgm:style>
+  </dgm:styleLbl>
+  <dgm:styleLbl name="asst4">
+    <dgm:scene3d>
+      <a:camera prst="orthographicFront"/>
+      <a:lightRig rig="threePt" dir="t"/>
+    </dgm:scene3d>
+    <dgm:sp3d/>
+    <dgm:txPr/>
+    <dgm:style>
+      <a:lnRef idx="2">
+        <a:scrgbClr r="0" g="0" b="0"/>
+      </a:lnRef>
+      <a:fillRef idx="1">
+        <a:scrgbClr r="0" g="0" b="0"/>
+      </a:fillRef>
+      <a:effectRef idx="0">
+        <a:scrgbClr r="0" g="0" b="0"/>
+      </a:effectRef>
+      <a:fontRef idx="minor">
+        <a:schemeClr val="lt1"/>
+      </a:fontRef>
+    </dgm:style>
+  </dgm:styleLbl>
+  <dgm:styleLbl name="parChTrans2D1">
+    <dgm:scene3d>
+      <a:camera prst="orthographicFront"/>
+      <a:lightRig rig="threePt" dir="t"/>
+    </dgm:scene3d>
+    <dgm:sp3d/>
+    <dgm:txPr/>
+    <dgm:style>
+      <a:lnRef idx="2">
+        <a:scrgbClr r="0" g="0" b="0"/>
+      </a:lnRef>
+      <a:fillRef idx="1">
+        <a:scrgbClr r="0" g="0" b="0"/>
+      </a:fillRef>
+      <a:effectRef idx="0">
+        <a:scrgbClr r="0" g="0" b="0"/>
+      </a:effectRef>
+      <a:fontRef idx="minor">
+        <a:schemeClr val="lt1"/>
+      </a:fontRef>
+    </dgm:style>
+  </dgm:styleLbl>
+  <dgm:styleLbl name="parChTrans2D2">
+    <dgm:scene3d>
+      <a:camera prst="orthographicFront"/>
+      <a:lightRig rig="threePt" dir="t"/>
+    </dgm:scene3d>
+    <dgm:sp3d/>
+    <dgm:txPr/>
+    <dgm:style>
+      <a:lnRef idx="2">
+        <a:scrgbClr r="0" g="0" b="0"/>
+      </a:lnRef>
+      <a:fillRef idx="1">
+        <a:scrgbClr r="0" g="0" b="0"/>
+      </a:fillRef>
+      <a:effectRef idx="0">
+        <a:scrgbClr r="0" g="0" b="0"/>
+      </a:effectRef>
+      <a:fontRef idx="minor">
+        <a:schemeClr val="lt1"/>
+      </a:fontRef>
+    </dgm:style>
+  </dgm:styleLbl>
+  <dgm:styleLbl name="parChTrans2D3">
+    <dgm:scene3d>
+      <a:camera prst="orthographicFront"/>
+      <a:lightRig rig="threePt" dir="t"/>
+    </dgm:scene3d>
+    <dgm:sp3d/>
+    <dgm:txPr/>
+    <dgm:style>
+      <a:lnRef idx="2">
+        <a:scrgbClr r="0" g="0" b="0"/>
+      </a:lnRef>
+      <a:fillRef idx="1">
+        <a:scrgbClr r="0" g="0" b="0"/>
+      </a:fillRef>
+      <a:effectRef idx="0">
+        <a:scrgbClr r="0" g="0" b="0"/>
+      </a:effectRef>
+      <a:fontRef idx="minor">
+        <a:schemeClr val="lt1"/>
+      </a:fontRef>
+    </dgm:style>
+  </dgm:styleLbl>
+  <dgm:styleLbl name="parChTrans2D4">
+    <dgm:scene3d>
+      <a:camera prst="orthographicFront"/>
+      <a:lightRig rig="threePt" dir="t"/>
+    </dgm:scene3d>
+    <dgm:sp3d/>
+    <dgm:txPr/>
+    <dgm:style>
+      <a:lnRef idx="2">
+        <a:scrgbClr r="0" g="0" b="0"/>
+      </a:lnRef>
+      <a:fillRef idx="1">
+        <a:scrgbClr r="0" g="0" b="0"/>
+      </a:fillRef>
+      <a:effectRef idx="0">
+        <a:scrgbClr r="0" g="0" b="0"/>
+      </a:effectRef>
+      <a:fontRef idx="minor">
+        <a:schemeClr val="lt1"/>
+      </a:fontRef>
+    </dgm:style>
+  </dgm:styleLbl>
+  <dgm:styleLbl name="parChTrans1D1">
+    <dgm:scene3d>
+      <a:camera prst="orthographicFront"/>
+      <a:lightRig rig="threePt" dir="t"/>
+    </dgm:scene3d>
+    <dgm:sp3d/>
+    <dgm:txPr/>
+    <dgm:style>
+      <a:lnRef idx="2">
+        <a:scrgbClr r="0" g="0" b="0"/>
+      </a:lnRef>
+      <a:fillRef idx="0">
+        <a:scrgbClr r="0" g="0" b="0"/>
+      </a:fillRef>
+      <a:effectRef idx="0">
+        <a:scrgbClr r="0" g="0" b="0"/>
+      </a:effectRef>
+      <a:fontRef idx="minor"/>
+    </dgm:style>
+  </dgm:styleLbl>
+  <dgm:styleLbl name="parChTrans1D2">
+    <dgm:scene3d>
+      <a:camera prst="orthographicFront"/>
+      <a:lightRig rig="threePt" dir="t"/>
+    </dgm:scene3d>
+    <dgm:sp3d/>
+    <dgm:txPr/>
+    <dgm:style>
+      <a:lnRef idx="2">
+        <a:scrgbClr r="0" g="0" b="0"/>
+      </a:lnRef>
+      <a:fillRef idx="0">
+        <a:scrgbClr r="0" g="0" b="0"/>
+      </a:fillRef>
+      <a:effectRef idx="0">
+        <a:scrgbClr r="0" g="0" b="0"/>
+      </a:effectRef>
+      <a:fontRef idx="minor"/>
+    </dgm:style>
+  </dgm:styleLbl>
+  <dgm:styleLbl name="parChTrans1D3">
+    <dgm:scene3d>
+      <a:camera prst="orthographicFront"/>
+      <a:lightRig rig="threePt" dir="t"/>
+    </dgm:scene3d>
+    <dgm:sp3d/>
+    <dgm:txPr/>
+    <dgm:style>
+      <a:lnRef idx="2">
+        <a:scrgbClr r="0" g="0" b="0"/>
+      </a:lnRef>
+      <a:fillRef idx="0">
+        <a:scrgbClr r="0" g="0" b="0"/>
+      </a:fillRef>
+      <a:effectRef idx="0">
+        <a:scrgbClr r="0" g="0" b="0"/>
+      </a:effectRef>
+      <a:fontRef idx="minor"/>
+    </dgm:style>
+  </dgm:styleLbl>
+  <dgm:styleLbl name="parChTrans1D4">
+    <dgm:scene3d>
+      <a:camera prst="orthographicFront"/>
+      <a:lightRig rig="threePt" dir="t"/>
+    </dgm:scene3d>
+    <dgm:sp3d/>
+    <dgm:txPr/>
+    <dgm:style>
+      <a:lnRef idx="2">
+        <a:scrgbClr r="0" g="0" b="0"/>
+      </a:lnRef>
+      <a:fillRef idx="0">
+        <a:scrgbClr r="0" g="0" b="0"/>
+      </a:fillRef>
+      <a:effectRef idx="0">
+        <a:scrgbClr r="0" g="0" b="0"/>
+      </a:effectRef>
+      <a:fontRef idx="minor"/>
+    </dgm:style>
+  </dgm:styleLbl>
+  <dgm:styleLbl name="fgAcc1">
+    <dgm:scene3d>
+      <a:camera prst="orthographicFront"/>
+      <a:lightRig rig="threePt" dir="t"/>
+    </dgm:scene3d>
+    <dgm:sp3d/>
+    <dgm:txPr/>
+    <dgm:style>
+      <a:lnRef idx="2">
+        <a:scrgbClr r="0" g="0" b="0"/>
+      </a:lnRef>
+      <a:fillRef idx="1">
+        <a:scrgbClr r="0" g="0" b="0"/>
+      </a:fillRef>
+      <a:effectRef idx="0">
+        <a:scrgbClr r="0" g="0" b="0"/>
+      </a:effectRef>
+      <a:fontRef idx="minor"/>
+    </dgm:style>
+  </dgm:styleLbl>
+  <dgm:styleLbl name="conFgAcc1">
+    <dgm:scene3d>
+      <a:camera prst="orthographicFront"/>
+      <a:lightRig rig="threePt" dir="t"/>
+    </dgm:scene3d>
+    <dgm:sp3d/>
+    <dgm:txPr/>
+    <dgm:style>
+      <a:lnRef idx="2">
+        <a:scrgbClr r="0" g="0" b="0"/>
+      </a:lnRef>
+      <a:fillRef idx="1">
+        <a:scrgbClr r="0" g="0" b="0"/>
+      </a:fillRef>
+      <a:effectRef idx="0">
+        <a:scrgbClr r="0" g="0" b="0"/>
+      </a:effectRef>
+      <a:fontRef idx="minor"/>
+    </dgm:style>
+  </dgm:styleLbl>
+  <dgm:styleLbl name="alignAcc1">
+    <dgm:scene3d>
+      <a:camera prst="orthographicFront"/>
+      <a:lightRig rig="threePt" dir="t"/>
+    </dgm:scene3d>
+    <dgm:sp3d/>
+    <dgm:txPr/>
+    <dgm:style>
+      <a:lnRef idx="2">
+        <a:scrgbClr r="0" g="0" b="0"/>
+      </a:lnRef>
+      <a:fillRef idx="1">
+        <a:scrgbClr r="0" g="0" b="0"/>
+      </a:fillRef>
+      <a:effectRef idx="0">
+        <a:scrgbClr r="0" g="0" b="0"/>
+      </a:effectRef>
+      <a:fontRef idx="minor"/>
+    </dgm:style>
+  </dgm:styleLbl>
+  <dgm:styleLbl name="trAlignAcc1">
+    <dgm:scene3d>
+      <a:camera prst="orthographicFront"/>
+      <a:lightRig rig="threePt" dir="t"/>
+    </dgm:scene3d>
+    <dgm:sp3d/>
+    <dgm:txPr/>
+    <dgm:style>
+      <a:lnRef idx="1">
+        <a:scrgbClr r="0" g="0" b="0"/>
+      </a:lnRef>
+      <a:fillRef idx="1">
+        <a:scrgbClr r="0" g="0" b="0"/>
+      </a:fillRef>
+      <a:effectRef idx="0">
+        <a:scrgbClr r="0" g="0" b="0"/>
+      </a:effectRef>
+      <a:fontRef idx="minor"/>
+    </dgm:style>
+  </dgm:styleLbl>
+  <dgm:styleLbl name="bgAcc1">
+    <dgm:scene3d>
+      <a:camera prst="orthographicFront"/>
+      <a:lightRig rig="threePt" dir="t"/>
+    </dgm:scene3d>
+    <dgm:sp3d/>
+    <dgm:txPr/>
+    <dgm:style>
+      <a:lnRef idx="2">
+        <a:scrgbClr r="0" g="0" b="0"/>
+      </a:lnRef>
+      <a:fillRef idx="1">
+        <a:scrgbClr r="0" g="0" b="0"/>
+      </a:fillRef>
+      <a:effectRef idx="0">
+        <a:scrgbClr r="0" g="0" b="0"/>
+      </a:effectRef>
+      <a:fontRef idx="minor"/>
+    </dgm:style>
+  </dgm:styleLbl>
+  <dgm:styleLbl name="solidFgAcc1">
+    <dgm:scene3d>
+      <a:camera prst="orthographicFront"/>
+      <a:lightRig rig="threePt" dir="t"/>
+    </dgm:scene3d>
+    <dgm:sp3d/>
+    <dgm:txPr/>
+    <dgm:style>
+      <a:lnRef idx="2">
+        <a:scrgbClr r="0" g="0" b="0"/>
+      </a:lnRef>
+      <a:fillRef idx="1">
+        <a:scrgbClr r="0" g="0" b="0"/>
+      </a:fillRef>
+      <a:effectRef idx="0">
+        <a:scrgbClr r="0" g="0" b="0"/>
+      </a:effectRef>
+      <a:fontRef idx="minor"/>
+    </dgm:style>
+  </dgm:styleLbl>
+  <dgm:styleLbl name="solidAlignAcc1">
+    <dgm:scene3d>
+      <a:camera prst="orthographicFront"/>
+      <a:lightRig rig="threePt" dir="t"/>
+    </dgm:scene3d>
+    <dgm:sp3d/>
+    <dgm:txPr/>
+    <dgm:style>
+      <a:lnRef idx="2">
+        <a:scrgbClr r="0" g="0" b="0"/>
+      </a:lnRef>
+      <a:fillRef idx="1">
+        <a:scrgbClr r="0" g="0" b="0"/>
+      </a:fillRef>
+      <a:effectRef idx="0">
+        <a:scrgbClr r="0" g="0" b="0"/>
+      </a:effectRef>
+      <a:fontRef idx="minor"/>
+    </dgm:style>
+  </dgm:styleLbl>
+  <dgm:styleLbl name="solidBgAcc1">
+    <dgm:scene3d>
+      <a:camera prst="orthographicFront"/>
+      <a:lightRig rig="threePt" dir="t"/>
+    </dgm:scene3d>
+    <dgm:sp3d/>
+    <dgm:txPr/>
+    <dgm:style>
+      <a:lnRef idx="2">
+        <a:scrgbClr r="0" g="0" b="0"/>
+      </a:lnRef>
+      <a:fillRef idx="1">
+        <a:scrgbClr r="0" g="0" b="0"/>
+      </a:fillRef>
+      <a:effectRef idx="0">
+        <a:scrgbClr r="0" g="0" b="0"/>
+      </a:effectRef>
+      <a:fontRef idx="minor"/>
+    </dgm:style>
+  </dgm:styleLbl>
+  <dgm:styleLbl name="fgAccFollowNode1">
+    <dgm:scene3d>
+      <a:camera prst="orthographicFront"/>
+      <a:lightRig rig="threePt" dir="t"/>
+    </dgm:scene3d>
+    <dgm:sp3d/>
+    <dgm:txPr/>
+    <dgm:style>
+      <a:lnRef idx="2">
+        <a:scrgbClr r="0" g="0" b="0"/>
+      </a:lnRef>
+      <a:fillRef idx="1">
+        <a:scrgbClr r="0" g="0" b="0"/>
+      </a:fillRef>
+      <a:effectRef idx="0">
+        <a:scrgbClr r="0" g="0" b="0"/>
+      </a:effectRef>
+      <a:fontRef idx="minor"/>
+    </dgm:style>
+  </dgm:styleLbl>
+  <dgm:styleLbl name="alignAccFollowNode1">
+    <dgm:scene3d>
+      <a:camera prst="orthographicFront"/>
+      <a:lightRig rig="threePt" dir="t"/>
+    </dgm:scene3d>
+    <dgm:sp3d/>
+    <dgm:txPr/>
+    <dgm:style>
+      <a:lnRef idx="2">
+        <a:scrgbClr r="0" g="0" b="0"/>
+      </a:lnRef>
+      <a:fillRef idx="1">
+        <a:scrgbClr r="0" g="0" b="0"/>
+      </a:fillRef>
+      <a:effectRef idx="0">
+        <a:scrgbClr r="0" g="0" b="0"/>
+      </a:effectRef>
+      <a:fontRef idx="minor"/>
+    </dgm:style>
+  </dgm:styleLbl>
+  <dgm:styleLbl name="bgAccFollowNode1">
+    <dgm:scene3d>
+      <a:camera prst="orthographicFront"/>
+      <a:lightRig rig="threePt" dir="t"/>
+    </dgm:scene3d>
+    <dgm:sp3d/>
+    <dgm:txPr/>
+    <dgm:style>
+      <a:lnRef idx="2">
+        <a:scrgbClr r="0" g="0" b="0"/>
+      </a:lnRef>
+      <a:fillRef idx="1">
+        <a:scrgbClr r="0" g="0" b="0"/>
+      </a:fillRef>
+      <a:effectRef idx="0">
+        <a:scrgbClr r="0" g="0" b="0"/>
+      </a:effectRef>
+      <a:fontRef idx="minor"/>
+    </dgm:style>
+  </dgm:styleLbl>
+  <dgm:styleLbl name="fgAcc0">
+    <dgm:scene3d>
+      <a:camera prst="orthographicFront"/>
+      <a:lightRig rig="threePt" dir="t"/>
+    </dgm:scene3d>
+    <dgm:sp3d/>
+    <dgm:txPr/>
+    <dgm:style>
+      <a:lnRef idx="2">
+        <a:scrgbClr r="0" g="0" b="0"/>
+      </a:lnRef>
+      <a:fillRef idx="1">
+        <a:scrgbClr r="0" g="0" b="0"/>
+      </a:fillRef>
+      <a:effectRef idx="0">
+        <a:scrgbClr r="0" g="0" b="0"/>
+      </a:effectRef>
+      <a:fontRef idx="minor"/>
+    </dgm:style>
+  </dgm:styleLbl>
+  <dgm:styleLbl name="fgAcc2">
+    <dgm:scene3d>
+      <a:camera prst="orthographicFront"/>
+      <a:lightRig rig="threePt" dir="t"/>
+    </dgm:scene3d>
+    <dgm:sp3d/>
+    <dgm:txPr/>
+    <dgm:style>
+      <a:lnRef idx="2">
+        <a:scrgbClr r="0" g="0" b="0"/>
+      </a:lnRef>
+      <a:fillRef idx="1">
+        <a:scrgbClr r="0" g="0" b="0"/>
+      </a:fillRef>
+      <a:effectRef idx="0">
+        <a:scrgbClr r="0" g="0" b="0"/>
+      </a:effectRef>
+      <a:fontRef idx="minor"/>
+    </dgm:style>
+  </dgm:styleLbl>
+  <dgm:styleLbl name="fgAcc3">
+    <dgm:scene3d>
+      <a:camera prst="orthographicFront"/>
+      <a:lightRig rig="threePt" dir="t"/>
+    </dgm:scene3d>
+    <dgm:sp3d/>
+    <dgm:txPr/>
+    <dgm:style>
+      <a:lnRef idx="2">
+        <a:scrgbClr r="0" g="0" b="0"/>
+      </a:lnRef>
+      <a:fillRef idx="1">
+        <a:scrgbClr r="0" g="0" b="0"/>
+      </a:fillRef>
+      <a:effectRef idx="0">
+        <a:scrgbClr r="0" g="0" b="0"/>
+      </a:effectRef>
+      <a:fontRef idx="minor"/>
+    </dgm:style>
+  </dgm:styleLbl>
+  <dgm:styleLbl name="fgAcc4">
+    <dgm:scene3d>
+      <a:camera prst="orthographicFront"/>
+      <a:lightRig rig="threePt" dir="t"/>
+    </dgm:scene3d>
+    <dgm:sp3d/>
+    <dgm:txPr/>
+    <dgm:style>
+      <a:lnRef idx="2">
+        <a:scrgbClr r="0" g="0" b="0"/>
+      </a:lnRef>
+      <a:fillRef idx="1">
+        <a:scrgbClr r="0" g="0" b="0"/>
+      </a:fillRef>
+      <a:effectRef idx="0">
+        <a:scrgbClr r="0" g="0" b="0"/>
+      </a:effectRef>
+      <a:fontRef idx="minor"/>
+    </dgm:style>
+  </dgm:styleLbl>
+  <dgm:styleLbl name="bgShp">
+    <dgm:scene3d>
+      <a:camera prst="orthographicFront"/>
+      <a:lightRig rig="threePt" dir="t"/>
+    </dgm:scene3d>
+    <dgm:sp3d/>
+    <dgm:txPr/>
+    <dgm:style>
+      <a:lnRef idx="0">
+        <a:scrgbClr r="0" g="0" b="0"/>
+      </a:lnRef>
+      <a:fillRef idx="1">
+        <a:scrgbClr r="0" g="0" b="0"/>
+      </a:fillRef>
+      <a:effectRef idx="0">
+        <a:scrgbClr r="0" g="0" b="0"/>
+      </a:effectRef>
+      <a:fontRef idx="minor"/>
+    </dgm:style>
+  </dgm:styleLbl>
+  <dgm:styleLbl name="dkBgShp">
+    <dgm:scene3d>
+      <a:camera prst="orthographicFront"/>
+      <a:lightRig rig="threePt" dir="t"/>
+    </dgm:scene3d>
+    <dgm:sp3d/>
+    <dgm:txPr/>
+    <dgm:style>
+      <a:lnRef idx="0">
+        <a:scrgbClr r="0" g="0" b="0"/>
+      </a:lnRef>
+      <a:fillRef idx="1">
+        <a:scrgbClr r="0" g="0" b="0"/>
+      </a:fillRef>
+      <a:effectRef idx="0">
+        <a:scrgbClr r="0" g="0" b="0"/>
+      </a:effectRef>
+      <a:fontRef idx="minor"/>
+    </dgm:style>
+  </dgm:styleLbl>
+  <dgm:styleLbl name="trBgShp">
+    <dgm:scene3d>
+      <a:camera prst="orthographicFront"/>
+      <a:lightRig rig="threePt" dir="t"/>
+    </dgm:scene3d>
+    <dgm:sp3d/>
+    <dgm:txPr/>
+    <dgm:style>
+      <a:lnRef idx="0">
+        <a:scrgbClr r="0" g="0" b="0"/>
+      </a:lnRef>
+      <a:fillRef idx="1">
+        <a:scrgbClr r="0" g="0" b="0"/>
+      </a:fillRef>
+      <a:effectRef idx="0">
+        <a:scrgbClr r="0" g="0" b="0"/>
+      </a:effectRef>
+      <a:fontRef idx="minor"/>
+    </dgm:style>
+  </dgm:styleLbl>
+  <dgm:styleLbl name="fgShp">
+    <dgm:scene3d>
+      <a:camera prst="orthographicFront"/>
+      <a:lightRig rig="threePt" dir="t"/>
+    </dgm:scene3d>
+    <dgm:sp3d/>
+    <dgm:txPr/>
+    <dgm:style>
+      <a:lnRef idx="2">
+        <a:scrgbClr r="0" g="0" b="0"/>
+      </a:lnRef>
+      <a:fillRef idx="1">
+        <a:scrgbClr r="0" g="0" b="0"/>
+      </a:fillRef>
+      <a:effectRef idx="0">
+        <a:scrgbClr r="0" g="0" b="0"/>
+      </a:effectRef>
+      <a:fontRef idx="minor"/>
+    </dgm:style>
+  </dgm:styleLbl>
+  <dgm:styleLbl name="revTx">
+    <dgm:scene3d>
+      <a:camera prst="orthographicFront"/>
+      <a:lightRig rig="threePt" dir="t"/>
+    </dgm:scene3d>
+    <dgm:sp3d/>
+    <dgm:txPr/>
+    <dgm:style>
+      <a:lnRef idx="0">
+        <a:scrgbClr r="0" g="0" b="0"/>
+      </a:lnRef>
+      <a:fillRef idx="0">
+        <a:scrgbClr r="0" g="0" b="0"/>
+      </a:fillRef>
+      <a:effectRef idx="0">
+        <a:scrgbClr r="0" g="0" b="0"/>
+      </a:effectRef>
+      <a:fontRef idx="minor"/>
+    </dgm:style>
+  </dgm:styleLbl>
+</dgm:styleDef>
+</file>
+
 <file path=ppt/notesMasters/notesMaster1.xml><?xml version="1.0" encoding="utf-8"?>
 <p:notesMaster xmlns:a="http://schemas.openxmlformats.org/drawingml/2006/main" xmlns:r="http://schemas.openxmlformats.org/officeDocument/2006/relationships" xmlns:p="http://schemas.openxmlformats.org/presentationml/2006/main">
   <p:cSld>
@@ -200,7 +3451,7 @@
           <a:p>
             <a:fld id="{0940B6BF-36C2-FE40-9D87-74A6571A2F6B}" type="datetimeFigureOut">
               <a:rPr lang="en-US" smtClean="0"/>
-              <a:t>9/7/22</a:t>
+              <a:t>9/7/24</a:t>
             </a:fld>
             <a:endParaRPr lang="en-US"/>
           </a:p>
@@ -1189,7 +4440,7 @@
           <a:p>
             <a:fld id="{170D5C3A-A955-5A40-9462-01A264051331}" type="datetimeFigureOut">
               <a:rPr lang="en-US" smtClean="0"/>
-              <a:t>9/7/22</a:t>
+              <a:t>9/7/24</a:t>
             </a:fld>
             <a:endParaRPr lang="en-US"/>
           </a:p>
@@ -1440,7 +4691,7 @@
           <a:p>
             <a:fld id="{170D5C3A-A955-5A40-9462-01A264051331}" type="datetimeFigureOut">
               <a:rPr lang="en-US" smtClean="0"/>
-              <a:t>9/7/22</a:t>
+              <a:t>9/7/24</a:t>
             </a:fld>
             <a:endParaRPr lang="en-US"/>
           </a:p>
@@ -1754,7 +5005,7 @@
           <a:p>
             <a:fld id="{170D5C3A-A955-5A40-9462-01A264051331}" type="datetimeFigureOut">
               <a:rPr lang="en-US" smtClean="0"/>
-              <a:t>9/7/22</a:t>
+              <a:t>9/7/24</a:t>
             </a:fld>
             <a:endParaRPr lang="en-US"/>
           </a:p>
@@ -2095,7 +5346,7 @@
           <a:p>
             <a:fld id="{170D5C3A-A955-5A40-9462-01A264051331}" type="datetimeFigureOut">
               <a:rPr lang="en-US" smtClean="0"/>
-              <a:t>9/7/22</a:t>
+              <a:t>9/7/24</a:t>
             </a:fld>
             <a:endParaRPr lang="en-US"/>
           </a:p>
@@ -2409,7 +5660,7 @@
           <a:p>
             <a:fld id="{170D5C3A-A955-5A40-9462-01A264051331}" type="datetimeFigureOut">
               <a:rPr lang="en-US" smtClean="0"/>
-              <a:t>9/7/22</a:t>
+              <a:t>9/7/24</a:t>
             </a:fld>
             <a:endParaRPr lang="en-US"/>
           </a:p>
@@ -2802,7 +6053,7 @@
           <a:p>
             <a:fld id="{170D5C3A-A955-5A40-9462-01A264051331}" type="datetimeFigureOut">
               <a:rPr lang="en-US" smtClean="0"/>
-              <a:t>9/7/22</a:t>
+              <a:t>9/7/24</a:t>
             </a:fld>
             <a:endParaRPr lang="en-US"/>
           </a:p>
@@ -2972,7 +6223,7 @@
           <a:p>
             <a:fld id="{170D5C3A-A955-5A40-9462-01A264051331}" type="datetimeFigureOut">
               <a:rPr lang="en-US" smtClean="0"/>
-              <a:t>9/7/22</a:t>
+              <a:t>9/7/24</a:t>
             </a:fld>
             <a:endParaRPr lang="en-US"/>
           </a:p>
@@ -3152,7 +6403,7 @@
           <a:p>
             <a:fld id="{170D5C3A-A955-5A40-9462-01A264051331}" type="datetimeFigureOut">
               <a:rPr lang="en-US" smtClean="0"/>
-              <a:t>9/7/22</a:t>
+              <a:t>9/7/24</a:t>
             </a:fld>
             <a:endParaRPr lang="en-US"/>
           </a:p>
@@ -3328,7 +6579,7 @@
           <a:p>
             <a:fld id="{170D5C3A-A955-5A40-9462-01A264051331}" type="datetimeFigureOut">
               <a:rPr lang="en-US" smtClean="0"/>
-              <a:t>9/7/22</a:t>
+              <a:t>9/7/24</a:t>
             </a:fld>
             <a:endParaRPr lang="en-US"/>
           </a:p>
@@ -3575,7 +6826,7 @@
           <a:p>
             <a:fld id="{170D5C3A-A955-5A40-9462-01A264051331}" type="datetimeFigureOut">
               <a:rPr lang="en-US" smtClean="0"/>
-              <a:t>9/7/22</a:t>
+              <a:t>9/7/24</a:t>
             </a:fld>
             <a:endParaRPr lang="en-US"/>
           </a:p>
@@ -3807,7 +7058,7 @@
           <a:p>
             <a:fld id="{170D5C3A-A955-5A40-9462-01A264051331}" type="datetimeFigureOut">
               <a:rPr lang="en-US" smtClean="0"/>
-              <a:t>9/7/22</a:t>
+              <a:t>9/7/24</a:t>
             </a:fld>
             <a:endParaRPr lang="en-US"/>
           </a:p>
@@ -4181,7 +7432,7 @@
           <a:p>
             <a:fld id="{170D5C3A-A955-5A40-9462-01A264051331}" type="datetimeFigureOut">
               <a:rPr lang="en-US" smtClean="0"/>
-              <a:t>9/7/22</a:t>
+              <a:t>9/7/24</a:t>
             </a:fld>
             <a:endParaRPr lang="en-US"/>
           </a:p>
@@ -4304,7 +7555,7 @@
           <a:p>
             <a:fld id="{170D5C3A-A955-5A40-9462-01A264051331}" type="datetimeFigureOut">
               <a:rPr lang="en-US" smtClean="0"/>
-              <a:t>9/7/22</a:t>
+              <a:t>9/7/24</a:t>
             </a:fld>
             <a:endParaRPr lang="en-US"/>
           </a:p>
@@ -4399,7 +7650,7 @@
           <a:p>
             <a:fld id="{170D5C3A-A955-5A40-9462-01A264051331}" type="datetimeFigureOut">
               <a:rPr lang="en-US" smtClean="0"/>
-              <a:t>9/7/22</a:t>
+              <a:t>9/7/24</a:t>
             </a:fld>
             <a:endParaRPr lang="en-US"/>
           </a:p>
@@ -4654,7 +7905,7 @@
           <a:p>
             <a:fld id="{170D5C3A-A955-5A40-9462-01A264051331}" type="datetimeFigureOut">
               <a:rPr lang="en-US" smtClean="0"/>
-              <a:t>9/7/22</a:t>
+              <a:t>9/7/24</a:t>
             </a:fld>
             <a:endParaRPr lang="en-US"/>
           </a:p>
@@ -4917,7 +8168,7 @@
           <a:p>
             <a:fld id="{170D5C3A-A955-5A40-9462-01A264051331}" type="datetimeFigureOut">
               <a:rPr lang="en-US" smtClean="0"/>
-              <a:t>9/7/22</a:t>
+              <a:t>9/7/24</a:t>
             </a:fld>
             <a:endParaRPr lang="en-US"/>
           </a:p>
@@ -5660,7 +8911,7 @@
           <a:p>
             <a:fld id="{170D5C3A-A955-5A40-9462-01A264051331}" type="datetimeFigureOut">
               <a:rPr lang="en-US" smtClean="0"/>
-              <a:t>9/7/22</a:t>
+              <a:t>9/7/24</a:t>
             </a:fld>
             <a:endParaRPr lang="en-US"/>
           </a:p>
@@ -6362,20 +9613,24 @@
           <a:p>
             <a:r>
               <a:rPr lang="en-US" dirty="0"/>
-              <a:t>Tour of Ocean Instrumentation Lab and CMS Research Pier</a:t>
+              <a:t>Prep for tour of Ocean Instrumentation Lab</a:t>
             </a:r>
           </a:p>
           <a:p>
             <a:r>
               <a:rPr lang="en-US" dirty="0"/>
-              <a:t>Pick two teammates and a sensor/platform of interest from today’s tour</a:t>
+              <a:t>Lab: Learn to distinguish git from GitHub and their combined capabilities</a:t>
             </a:r>
           </a:p>
           <a:p>
             <a:r>
               <a:rPr lang="en-US" dirty="0"/>
-              <a:t>Short (3–5 mins) presentation next week on your sensor/platform</a:t>
-            </a:r>
+              <a:t>Homework: Prepare to give a short (3–5 mins) presentation next week on your data</a:t>
+            </a:r>
+          </a:p>
+          <a:p>
+            <a:pPr lvl="1"/>
+            <a:endParaRPr lang="en-US" dirty="0"/>
           </a:p>
           <a:p>
             <a:endParaRPr lang="en-US" dirty="0"/>
@@ -6465,21 +9720,31 @@
           <a:p>
             <a:r>
               <a:rPr lang="en-US" dirty="0"/>
-              <a:t>Team up with two other people (for four teams of three people) and pick your favorite instrument in the OI Lab. Give a short (three to five minute presentation) in class on Sep. 8 on the following:</a:t>
+              <a:t>Team up with one other person (last week’s lab teammate) and pick your favorite dataset on </a:t>
+            </a:r>
+            <a:r>
+              <a:rPr lang="en-US" dirty="0">
+                <a:hlinkClick r:id="rId2"/>
+              </a:rPr>
+              <a:t>https://cormp.org/</a:t>
+            </a:r>
+            <a:r>
+              <a:rPr lang="en-US" dirty="0"/>
+              <a:t>. Give a short (3–5 minutes) presentation in class on Sep. 16 on the following:</a:t>
             </a:r>
           </a:p>
           <a:p>
             <a:pPr lvl="1"/>
             <a:r>
               <a:rPr lang="en-US" dirty="0"/>
-              <a:t>What the instrument is</a:t>
+              <a:t>What the parameter(s) is(are)</a:t>
             </a:r>
           </a:p>
           <a:p>
             <a:pPr lvl="1"/>
             <a:r>
               <a:rPr lang="en-US" dirty="0"/>
-              <a:t>What it can measure</a:t>
+              <a:t>How they were measured (look up sensors that measure your parameter)</a:t>
             </a:r>
           </a:p>
           <a:p>
@@ -6506,7 +9771,13 @@
           <a:p>
             <a:r>
               <a:rPr lang="en-US" dirty="0"/>
-              <a:t>Your presentation should be no more than one or two slides which you will submit on Canvas (via the Assignment post).</a:t>
+              <a:t>Your presentation should be no more than two or three slides which you will submit on Canvas (via the Assignment post)</a:t>
+            </a:r>
+          </a:p>
+          <a:p>
+            <a:r>
+              <a:rPr lang="en-US" dirty="0"/>
+              <a:t>You will also deliver presentation in class on Sep 16 or 23, time-dependent</a:t>
             </a:r>
           </a:p>
           <a:p>
@@ -6595,7 +9866,7 @@
           <a:p>
             <a:r>
               <a:rPr lang="en-US" dirty="0"/>
-              <a:t>Familiarize yourself with cutting-edge coastal technologies</a:t>
+              <a:t>Familiarize yourself with cutting-edge coastal technologies and datasets</a:t>
             </a:r>
           </a:p>
           <a:p>
@@ -6616,6 +9887,404 @@
     <p:extLst>
       <p:ext uri="{BB962C8B-B14F-4D97-AF65-F5344CB8AC3E}">
         <p14:creationId xmlns:p14="http://schemas.microsoft.com/office/powerpoint/2010/main" val="405895265"/>
+      </p:ext>
+    </p:extLst>
+  </p:cSld>
+  <p:clrMapOvr>
+    <a:masterClrMapping/>
+  </p:clrMapOvr>
+</p:sld>
+</file>
+
+<file path=ppt/slides/slide5.xml><?xml version="1.0" encoding="utf-8"?>
+<p:sld xmlns:a="http://schemas.openxmlformats.org/drawingml/2006/main" xmlns:r="http://schemas.openxmlformats.org/officeDocument/2006/relationships" xmlns:p="http://schemas.openxmlformats.org/presentationml/2006/main">
+  <p:cSld>
+    <p:bg>
+      <p:bgPr>
+        <a:solidFill>
+          <a:schemeClr val="bg1"/>
+        </a:solidFill>
+        <a:effectLst/>
+      </p:bgPr>
+    </p:bg>
+    <p:spTree>
+      <p:nvGrpSpPr>
+        <p:cNvPr id="1" name=""/>
+        <p:cNvGrpSpPr/>
+        <p:nvPr/>
+      </p:nvGrpSpPr>
+      <p:grpSpPr>
+        <a:xfrm>
+          <a:off x="0" y="0"/>
+          <a:ext cx="0" cy="0"/>
+          <a:chOff x="0" y="0"/>
+          <a:chExt cx="0" cy="0"/>
+        </a:xfrm>
+      </p:grpSpPr>
+      <p:sp useBgFill="1">
+        <p:nvSpPr>
+          <p:cNvPr id="9" name="Rectangle 8">
+            <a:extLst>
+              <a:ext uri="{FF2B5EF4-FFF2-40B4-BE49-F238E27FC236}">
+                <a16:creationId xmlns:a16="http://schemas.microsoft.com/office/drawing/2014/main" id="{9F4444CE-BC8D-4D61-B303-4C05614E62AB}"/>
+              </a:ext>
+              <a:ext uri="{C183D7F6-B498-43B3-948B-1728B52AA6E4}">
+                <adec:decorative xmlns:adec="http://schemas.microsoft.com/office/drawing/2017/decorative" val="1"/>
+              </a:ext>
+            </a:extLst>
+          </p:cNvPr>
+          <p:cNvSpPr>
+            <a:spLocks noGrp="1" noRot="1" noChangeAspect="1" noMove="1" noResize="1" noEditPoints="1" noAdjustHandles="1" noChangeArrowheads="1" noChangeShapeType="1" noTextEdit="1"/>
+          </p:cNvSpPr>
+          <p:nvPr>
+            <p:extLst>
+              <p:ext uri="{386F3935-93C4-4BCD-93E2-E3B085C9AB24}">
+                <p16:designElem xmlns:p16="http://schemas.microsoft.com/office/powerpoint/2015/main" val="1"/>
+              </p:ext>
+            </p:extLst>
+          </p:nvPr>
+        </p:nvSpPr>
+        <p:spPr>
+          <a:xfrm>
+            <a:off x="0" y="0"/>
+            <a:ext cx="12192000" cy="6858000"/>
+          </a:xfrm>
+          <a:prstGeom prst="rect">
+            <a:avLst/>
+          </a:prstGeom>
+          <a:ln>
+            <a:noFill/>
+          </a:ln>
+        </p:spPr>
+        <p:style>
+          <a:lnRef idx="2">
+            <a:schemeClr val="accent1">
+              <a:shade val="50000"/>
+            </a:schemeClr>
+          </a:lnRef>
+          <a:fillRef idx="1">
+            <a:schemeClr val="accent1"/>
+          </a:fillRef>
+          <a:effectRef idx="0">
+            <a:schemeClr val="accent1"/>
+          </a:effectRef>
+          <a:fontRef idx="minor">
+            <a:schemeClr val="lt1"/>
+          </a:fontRef>
+        </p:style>
+        <p:txBody>
+          <a:bodyPr rtlCol="0" anchor="ctr"/>
+          <a:lstStyle/>
+          <a:p>
+            <a:pPr algn="ctr"/>
+            <a:endParaRPr lang="en-US"/>
+          </a:p>
+        </p:txBody>
+      </p:sp>
+      <p:sp>
+        <p:nvSpPr>
+          <p:cNvPr id="2" name="Title 1">
+            <a:extLst>
+              <a:ext uri="{FF2B5EF4-FFF2-40B4-BE49-F238E27FC236}">
+                <a16:creationId xmlns:a16="http://schemas.microsoft.com/office/drawing/2014/main" id="{0EB7D0DA-2856-5FEA-A0BA-CA1C173D7A72}"/>
+              </a:ext>
+            </a:extLst>
+          </p:cNvPr>
+          <p:cNvSpPr>
+            <a:spLocks noGrp="1"/>
+          </p:cNvSpPr>
+          <p:nvPr>
+            <p:ph type="title"/>
+          </p:nvPr>
+        </p:nvSpPr>
+        <p:spPr>
+          <a:xfrm>
+            <a:off x="1286933" y="609600"/>
+            <a:ext cx="10197494" cy="1099457"/>
+          </a:xfrm>
+        </p:spPr>
+        <p:txBody>
+          <a:bodyPr>
+            <a:normAutofit/>
+          </a:bodyPr>
+          <a:lstStyle/>
+          <a:p>
+            <a:r>
+              <a:rPr lang="en-US" dirty="0"/>
+              <a:t>GitHub</a:t>
+            </a:r>
+          </a:p>
+        </p:txBody>
+      </p:sp>
+      <p:sp>
+        <p:nvSpPr>
+          <p:cNvPr id="11" name="Isosceles Triangle 10">
+            <a:extLst>
+              <a:ext uri="{FF2B5EF4-FFF2-40B4-BE49-F238E27FC236}">
+                <a16:creationId xmlns:a16="http://schemas.microsoft.com/office/drawing/2014/main" id="{73772B81-181F-48B7-8826-4D9686D15DF5}"/>
+              </a:ext>
+              <a:ext uri="{C183D7F6-B498-43B3-948B-1728B52AA6E4}">
+                <adec:decorative xmlns:adec="http://schemas.microsoft.com/office/drawing/2017/decorative" val="1"/>
+              </a:ext>
+            </a:extLst>
+          </p:cNvPr>
+          <p:cNvSpPr>
+            <a:spLocks noGrp="1" noRot="1" noChangeAspect="1" noMove="1" noResize="1" noEditPoints="1" noAdjustHandles="1" noChangeArrowheads="1" noChangeShapeType="1" noTextEdit="1"/>
+          </p:cNvSpPr>
+          <p:nvPr>
+            <p:extLst>
+              <p:ext uri="{386F3935-93C4-4BCD-93E2-E3B085C9AB24}">
+                <p16:designElem xmlns:p16="http://schemas.microsoft.com/office/powerpoint/2015/main" val="1"/>
+              </p:ext>
+            </p:extLst>
+          </p:nvPr>
+        </p:nvSpPr>
+        <p:spPr>
+          <a:xfrm rot="10800000">
+            <a:off x="0" y="0"/>
+            <a:ext cx="842596" cy="5666154"/>
+          </a:xfrm>
+          <a:prstGeom prst="triangle">
+            <a:avLst>
+              <a:gd name="adj" fmla="val 100000"/>
+            </a:avLst>
+          </a:prstGeom>
+          <a:solidFill>
+            <a:schemeClr val="accent1">
+              <a:alpha val="85000"/>
+            </a:schemeClr>
+          </a:solidFill>
+          <a:ln>
+            <a:noFill/>
+          </a:ln>
+          <a:effectLst/>
+        </p:spPr>
+        <p:style>
+          <a:lnRef idx="1">
+            <a:schemeClr val="accent1"/>
+          </a:lnRef>
+          <a:fillRef idx="3">
+            <a:schemeClr val="accent1"/>
+          </a:fillRef>
+          <a:effectRef idx="2">
+            <a:schemeClr val="accent1"/>
+          </a:effectRef>
+          <a:fontRef idx="minor">
+            <a:schemeClr val="lt1"/>
+          </a:fontRef>
+        </p:style>
+        <p:txBody>
+          <a:bodyPr/>
+          <a:lstStyle/>
+          <a:p>
+            <a:endParaRPr lang="en-US"/>
+          </a:p>
+        </p:txBody>
+      </p:sp>
+      <p:sp>
+        <p:nvSpPr>
+          <p:cNvPr id="13" name="Isosceles Triangle 12">
+            <a:extLst>
+              <a:ext uri="{FF2B5EF4-FFF2-40B4-BE49-F238E27FC236}">
+                <a16:creationId xmlns:a16="http://schemas.microsoft.com/office/drawing/2014/main" id="{B2205F6E-03C6-4E92-877C-E2482F6599AA}"/>
+              </a:ext>
+              <a:ext uri="{C183D7F6-B498-43B3-948B-1728B52AA6E4}">
+                <adec:decorative xmlns:adec="http://schemas.microsoft.com/office/drawing/2017/decorative" val="1"/>
+              </a:ext>
+            </a:extLst>
+          </p:cNvPr>
+          <p:cNvSpPr>
+            <a:spLocks noGrp="1" noRot="1" noChangeAspect="1" noMove="1" noResize="1" noEditPoints="1" noAdjustHandles="1" noChangeArrowheads="1" noChangeShapeType="1" noTextEdit="1"/>
+          </p:cNvSpPr>
+          <p:nvPr>
+            <p:extLst>
+              <p:ext uri="{386F3935-93C4-4BCD-93E2-E3B085C9AB24}">
+                <p16:designElem xmlns:p16="http://schemas.microsoft.com/office/powerpoint/2015/main" val="1"/>
+              </p:ext>
+            </p:extLst>
+          </p:nvPr>
+        </p:nvSpPr>
+        <p:spPr>
+          <a:xfrm flipH="1">
+            <a:off x="11743267" y="4013200"/>
+            <a:ext cx="448733" cy="2844800"/>
+          </a:xfrm>
+          <a:prstGeom prst="triangle">
+            <a:avLst>
+              <a:gd name="adj" fmla="val 0"/>
+            </a:avLst>
+          </a:prstGeom>
+          <a:solidFill>
+            <a:schemeClr val="accent1">
+              <a:alpha val="85000"/>
+            </a:schemeClr>
+          </a:solidFill>
+          <a:ln>
+            <a:noFill/>
+          </a:ln>
+          <a:effectLst/>
+        </p:spPr>
+        <p:style>
+          <a:lnRef idx="1">
+            <a:schemeClr val="accent1"/>
+          </a:lnRef>
+          <a:fillRef idx="3">
+            <a:schemeClr val="accent1"/>
+          </a:fillRef>
+          <a:effectRef idx="2">
+            <a:schemeClr val="accent1"/>
+          </a:effectRef>
+          <a:fontRef idx="minor">
+            <a:schemeClr val="lt1"/>
+          </a:fontRef>
+        </p:style>
+        <p:txBody>
+          <a:bodyPr/>
+          <a:lstStyle/>
+          <a:p>
+            <a:endParaRPr lang="en-US"/>
+          </a:p>
+        </p:txBody>
+      </p:sp>
+      <p:graphicFrame>
+        <p:nvGraphicFramePr>
+          <p:cNvPr id="5" name="Content Placeholder 2">
+            <a:extLst>
+              <a:ext uri="{FF2B5EF4-FFF2-40B4-BE49-F238E27FC236}">
+                <a16:creationId xmlns:a16="http://schemas.microsoft.com/office/drawing/2014/main" id="{283928B9-1804-8231-A2A1-FF70B616F377}"/>
+              </a:ext>
+            </a:extLst>
+          </p:cNvPr>
+          <p:cNvGraphicFramePr>
+            <a:graphicFrameLocks noGrp="1"/>
+          </p:cNvGraphicFramePr>
+          <p:nvPr>
+            <p:ph idx="1"/>
+            <p:extLst>
+              <p:ext uri="{D42A27DB-BD31-4B8C-83A1-F6EECF244321}">
+                <p14:modId xmlns:p14="http://schemas.microsoft.com/office/powerpoint/2010/main" val="108468211"/>
+              </p:ext>
+            </p:extLst>
+          </p:nvPr>
+        </p:nvGraphicFramePr>
+        <p:xfrm>
+          <a:off x="1286933" y="1948543"/>
+          <a:ext cx="9618133" cy="4093482"/>
+        </p:xfrm>
+        <a:graphic>
+          <a:graphicData uri="http://schemas.openxmlformats.org/drawingml/2006/diagram">
+            <dgm:relIds xmlns:dgm="http://schemas.openxmlformats.org/drawingml/2006/diagram" xmlns:r="http://schemas.openxmlformats.org/officeDocument/2006/relationships" r:dm="rId2" r:lo="rId3" r:qs="rId4" r:cs="rId5"/>
+          </a:graphicData>
+        </a:graphic>
+      </p:graphicFrame>
+    </p:spTree>
+    <p:extLst>
+      <p:ext uri="{BB962C8B-B14F-4D97-AF65-F5344CB8AC3E}">
+        <p14:creationId xmlns:p14="http://schemas.microsoft.com/office/powerpoint/2010/main" val="2872610146"/>
+      </p:ext>
+    </p:extLst>
+  </p:cSld>
+  <p:clrMapOvr>
+    <a:masterClrMapping/>
+  </p:clrMapOvr>
+</p:sld>
+</file>
+
+<file path=ppt/slides/slide6.xml><?xml version="1.0" encoding="utf-8"?>
+<p:sld xmlns:a="http://schemas.openxmlformats.org/drawingml/2006/main" xmlns:r="http://schemas.openxmlformats.org/officeDocument/2006/relationships" xmlns:p="http://schemas.openxmlformats.org/presentationml/2006/main">
+  <p:cSld>
+    <p:spTree>
+      <p:nvGrpSpPr>
+        <p:cNvPr id="1" name=""/>
+        <p:cNvGrpSpPr/>
+        <p:nvPr/>
+      </p:nvGrpSpPr>
+      <p:grpSpPr>
+        <a:xfrm>
+          <a:off x="0" y="0"/>
+          <a:ext cx="0" cy="0"/>
+          <a:chOff x="0" y="0"/>
+          <a:chExt cx="0" cy="0"/>
+        </a:xfrm>
+      </p:grpSpPr>
+      <p:sp>
+        <p:nvSpPr>
+          <p:cNvPr id="2" name="Title 1">
+            <a:extLst>
+              <a:ext uri="{FF2B5EF4-FFF2-40B4-BE49-F238E27FC236}">
+                <a16:creationId xmlns:a16="http://schemas.microsoft.com/office/drawing/2014/main" id="{AFA61825-6B95-6218-F915-09269996DDC0}"/>
+              </a:ext>
+            </a:extLst>
+          </p:cNvPr>
+          <p:cNvSpPr>
+            <a:spLocks noGrp="1"/>
+          </p:cNvSpPr>
+          <p:nvPr>
+            <p:ph type="title"/>
+          </p:nvPr>
+        </p:nvSpPr>
+        <p:spPr/>
+        <p:txBody>
+          <a:bodyPr/>
+          <a:lstStyle/>
+          <a:p>
+            <a:r>
+              <a:rPr lang="en-US" dirty="0"/>
+              <a:t>GitHub exercise</a:t>
+            </a:r>
+          </a:p>
+        </p:txBody>
+      </p:sp>
+      <p:sp>
+        <p:nvSpPr>
+          <p:cNvPr id="3" name="Content Placeholder 2">
+            <a:extLst>
+              <a:ext uri="{FF2B5EF4-FFF2-40B4-BE49-F238E27FC236}">
+                <a16:creationId xmlns:a16="http://schemas.microsoft.com/office/drawing/2014/main" id="{B93EFC2A-636B-245A-9D40-DF88A3E9093D}"/>
+              </a:ext>
+            </a:extLst>
+          </p:cNvPr>
+          <p:cNvSpPr>
+            <a:spLocks noGrp="1"/>
+          </p:cNvSpPr>
+          <p:nvPr>
+            <p:ph idx="1"/>
+          </p:nvPr>
+        </p:nvSpPr>
+        <p:spPr/>
+        <p:txBody>
+          <a:bodyPr/>
+          <a:lstStyle/>
+          <a:p>
+            <a:r>
+              <a:rPr lang="en-US" dirty="0"/>
+              <a:t>Read this page: </a:t>
+            </a:r>
+            <a:r>
+              <a:rPr lang="en-US" dirty="0">
+                <a:hlinkClick r:id="rId2"/>
+              </a:rPr>
+              <a:t>https://github.com/SUPScientist/Smart-Coasts/tree/main/Class-02-OILab-Tour</a:t>
+            </a:r>
+            <a:endParaRPr lang="en-US" dirty="0"/>
+          </a:p>
+          <a:p>
+            <a:r>
+              <a:rPr lang="en-US" dirty="0"/>
+              <a:t>After reading everything, complete at least the required and ideally the </a:t>
+            </a:r>
+            <a:r>
+              <a:rPr lang="en-US"/>
+              <a:t>optional steps</a:t>
+            </a:r>
+            <a:endParaRPr lang="en-US" dirty="0"/>
+          </a:p>
+        </p:txBody>
+      </p:sp>
+    </p:spTree>
+    <p:extLst>
+      <p:ext uri="{BB962C8B-B14F-4D97-AF65-F5344CB8AC3E}">
+        <p14:creationId xmlns:p14="http://schemas.microsoft.com/office/powerpoint/2010/main" val="362727850"/>
       </p:ext>
     </p:extLst>
   </p:cSld>
@@ -7175,4 +10844,10 @@
     </a:ext>
   </a:extLst>
 </a:theme>
+</file>
+
+<file path=docMetadata/LabelInfo.xml><?xml version="1.0" encoding="utf-8"?>
+<clbl:labelList xmlns:clbl="http://schemas.microsoft.com/office/2020/mipLabelMetadata">
+  <clbl:label id="{4e32bd2a-1ccd-49c1-a814-de8553946415}" enabled="1" method="Standard" siteId="{22136781-9753-4c75-af28-68a078871ebf}" contentBits="0" removed="0"/>
+</clbl:labelList>
 </file>
</xml_diff>